<commit_message>
time to brush teeth
</commit_message>
<xml_diff>
--- a/Week1_Describe/BachmeierNTIM8150-1.pptx
+++ b/Week1_Describe/BachmeierNTIM8150-1.pptx
@@ -11937,8 +11937,8 @@
 <file path=ppt/diagrams/data7.xml><?xml version="1.0" encoding="utf-8"?>
 <dgm:dataModel xmlns:dgm="http://schemas.openxmlformats.org/drawingml/2006/diagram" xmlns:a="http://schemas.openxmlformats.org/drawingml/2006/main">
   <dgm:ptLst>
-    <dgm:pt modelId="{3D8B9BA6-8FC2-4F61-B55A-C2EAE7DF8B3A}" type="doc">
-      <dgm:prSet loTypeId="urn:microsoft.com/office/officeart/2005/8/layout/orgChart1" loCatId="hierarchy" qsTypeId="urn:microsoft.com/office/officeart/2005/8/quickstyle/simple1" qsCatId="simple" csTypeId="urn:microsoft.com/office/officeart/2005/8/colors/accent1_2" csCatId="accent1" phldr="1"/>
+    <dgm:pt modelId="{742BCD6A-8A58-49BA-8A9D-354EBD5C41F7}" type="doc">
+      <dgm:prSet loTypeId="urn:microsoft.com/office/officeart/2005/8/layout/vList2" loCatId="list" qsTypeId="urn:microsoft.com/office/officeart/2005/8/quickstyle/simple1" qsCatId="simple" csTypeId="urn:microsoft.com/office/officeart/2005/8/colors/accent1_2" csCatId="accent1" phldr="1"/>
       <dgm:spPr/>
       <dgm:t>
         <a:bodyPr/>
@@ -11948,22 +11948,290 @@
         </a:p>
       </dgm:t>
     </dgm:pt>
-    <dgm:pt modelId="{95A660C1-7304-419C-9B10-494FBA034F63}" type="pres">
-      <dgm:prSet presAssocID="{3D8B9BA6-8FC2-4F61-B55A-C2EAE7DF8B3A}" presName="hierChild1" presStyleCnt="0">
+    <dgm:pt modelId="{9F2A07D5-CFE3-49C5-90ED-113111463B74}">
+      <dgm:prSet phldrT="[Text]"/>
+      <dgm:spPr/>
+      <dgm:t>
+        <a:bodyPr/>
+        <a:lstStyle/>
+        <a:p>
+          <a:r>
+            <a:rPr lang="en-US" dirty="0"/>
+            <a:t>Advantages</a:t>
+          </a:r>
+        </a:p>
+      </dgm:t>
+    </dgm:pt>
+    <dgm:pt modelId="{3484B0A8-68B1-484E-BDE6-5E2980B85848}" type="parTrans" cxnId="{94EAC7D5-FBDC-4D73-928F-3F02BC4B55C7}">
+      <dgm:prSet/>
+      <dgm:spPr/>
+      <dgm:t>
+        <a:bodyPr/>
+        <a:lstStyle/>
+        <a:p>
+          <a:endParaRPr lang="en-US"/>
+        </a:p>
+      </dgm:t>
+    </dgm:pt>
+    <dgm:pt modelId="{92C21145-145C-475A-A85C-2E6774D81D59}" type="sibTrans" cxnId="{94EAC7D5-FBDC-4D73-928F-3F02BC4B55C7}">
+      <dgm:prSet/>
+      <dgm:spPr/>
+      <dgm:t>
+        <a:bodyPr/>
+        <a:lstStyle/>
+        <a:p>
+          <a:endParaRPr lang="en-US"/>
+        </a:p>
+      </dgm:t>
+    </dgm:pt>
+    <dgm:pt modelId="{EE925F82-205C-4D99-B6F6-54D8E7C91EC9}">
+      <dgm:prSet phldrT="[Text]"/>
+      <dgm:spPr/>
+      <dgm:t>
+        <a:bodyPr/>
+        <a:lstStyle/>
+        <a:p>
+          <a:r>
+            <a:rPr lang="en-US" dirty="0"/>
+            <a:t>Disadvantages</a:t>
+          </a:r>
+        </a:p>
+      </dgm:t>
+    </dgm:pt>
+    <dgm:pt modelId="{6EF44F0B-950D-45ED-9486-3360061C2AF6}" type="parTrans" cxnId="{4E3FE041-FA8F-40C9-B880-025413EFE03C}">
+      <dgm:prSet/>
+      <dgm:spPr/>
+      <dgm:t>
+        <a:bodyPr/>
+        <a:lstStyle/>
+        <a:p>
+          <a:endParaRPr lang="en-US"/>
+        </a:p>
+      </dgm:t>
+    </dgm:pt>
+    <dgm:pt modelId="{3584D9A4-25C3-4532-B388-810B9ED20B47}" type="sibTrans" cxnId="{4E3FE041-FA8F-40C9-B880-025413EFE03C}">
+      <dgm:prSet/>
+      <dgm:spPr/>
+      <dgm:t>
+        <a:bodyPr/>
+        <a:lstStyle/>
+        <a:p>
+          <a:endParaRPr lang="en-US"/>
+        </a:p>
+      </dgm:t>
+    </dgm:pt>
+    <dgm:pt modelId="{80DFFCDB-39AA-40D2-AFDC-03E8AF287298}">
+      <dgm:prSet phldrT="[Text]"/>
+      <dgm:spPr/>
+      <dgm:t>
+        <a:bodyPr/>
+        <a:lstStyle/>
+        <a:p>
+          <a:r>
+            <a:rPr lang="en-US" dirty="0"/>
+            <a:t>Large models are ambiguous, drift, and require re-training</a:t>
+          </a:r>
+        </a:p>
+      </dgm:t>
+    </dgm:pt>
+    <dgm:pt modelId="{5C2DFB69-0FD6-47E2-BDBC-4914892E9EA8}" type="parTrans" cxnId="{29F25992-5164-4A05-999D-A3484E7DEF83}">
+      <dgm:prSet/>
+      <dgm:spPr/>
+      <dgm:t>
+        <a:bodyPr/>
+        <a:lstStyle/>
+        <a:p>
+          <a:endParaRPr lang="en-US"/>
+        </a:p>
+      </dgm:t>
+    </dgm:pt>
+    <dgm:pt modelId="{B11A1312-A7CF-4CE0-9237-0B797A4DE5D4}" type="sibTrans" cxnId="{29F25992-5164-4A05-999D-A3484E7DEF83}">
+      <dgm:prSet/>
+      <dgm:spPr/>
+      <dgm:t>
+        <a:bodyPr/>
+        <a:lstStyle/>
+        <a:p>
+          <a:endParaRPr lang="en-US"/>
+        </a:p>
+      </dgm:t>
+    </dgm:pt>
+    <dgm:pt modelId="{551E63CD-B471-4093-A979-BE90E2498678}">
+      <dgm:prSet phldrT="[Text]"/>
+      <dgm:spPr/>
+      <dgm:t>
+        <a:bodyPr/>
+        <a:lstStyle/>
+        <a:p>
+          <a:r>
+            <a:rPr lang="en-US" dirty="0"/>
+            <a:t>Reduce costs and increase automation</a:t>
+          </a:r>
+        </a:p>
+      </dgm:t>
+    </dgm:pt>
+    <dgm:pt modelId="{2D09BEC2-4C44-4D46-BE92-A62C797FFB30}" type="parTrans" cxnId="{63000271-87ED-4C62-991C-2A24AEA650F5}">
+      <dgm:prSet/>
+      <dgm:spPr/>
+    </dgm:pt>
+    <dgm:pt modelId="{A48A3CAE-D535-4E3C-A587-A4F4D6A05305}" type="sibTrans" cxnId="{63000271-87ED-4C62-991C-2A24AEA650F5}">
+      <dgm:prSet/>
+      <dgm:spPr/>
+    </dgm:pt>
+    <dgm:pt modelId="{D72181DA-6A6B-4D16-8127-CCD35B877485}">
+      <dgm:prSet phldrT="[Text]"/>
+      <dgm:spPr/>
+      <dgm:t>
+        <a:bodyPr/>
+        <a:lstStyle/>
+        <a:p>
+          <a:r>
+            <a:rPr lang="en-US" dirty="0"/>
+            <a:t>Secure model design is open problem</a:t>
+          </a:r>
+        </a:p>
+      </dgm:t>
+    </dgm:pt>
+    <dgm:pt modelId="{04D98175-771E-4AC7-ADC3-BAB3CCE1517E}" type="parTrans" cxnId="{3565EE84-E7E8-458D-B7A9-6925E4BA83C6}">
+      <dgm:prSet/>
+      <dgm:spPr/>
+    </dgm:pt>
+    <dgm:pt modelId="{2E0A4F87-CDBD-4572-97E2-333DACD6DB56}" type="sibTrans" cxnId="{3565EE84-E7E8-458D-B7A9-6925E4BA83C6}">
+      <dgm:prSet/>
+      <dgm:spPr/>
+    </dgm:pt>
+    <dgm:pt modelId="{4FC06292-9372-4997-9D8B-CB795BD196EF}">
+      <dgm:prSet phldrT="[Text]"/>
+      <dgm:spPr/>
+      <dgm:t>
+        <a:bodyPr/>
+        <a:lstStyle/>
+        <a:p>
+          <a:r>
+            <a:rPr lang="en-US" dirty="0"/>
+            <a:t>Dynamic environments are very complex</a:t>
+          </a:r>
+        </a:p>
+      </dgm:t>
+    </dgm:pt>
+    <dgm:pt modelId="{5084D200-375E-410B-A711-CC7F60EFC031}" type="parTrans" cxnId="{56D10467-9154-4897-9C78-4DF7E76B833B}">
+      <dgm:prSet/>
+      <dgm:spPr/>
+    </dgm:pt>
+    <dgm:pt modelId="{72AA9780-1B2A-4D30-8888-4CF30785F063}" type="sibTrans" cxnId="{56D10467-9154-4897-9C78-4DF7E76B833B}">
+      <dgm:prSet/>
+      <dgm:spPr/>
+    </dgm:pt>
+    <dgm:pt modelId="{E7859D01-B14A-4980-9DB3-C1878CB7D08C}">
+      <dgm:prSet phldrT="[Text]"/>
+      <dgm:spPr/>
+      <dgm:t>
+        <a:bodyPr/>
+        <a:lstStyle/>
+        <a:p>
+          <a:r>
+            <a:rPr lang="en-US" dirty="0"/>
+            <a:t>Manage complex decision processes</a:t>
+          </a:r>
+        </a:p>
+      </dgm:t>
+    </dgm:pt>
+    <dgm:pt modelId="{430AB2A9-7A95-495B-9A7C-6078E5BFE135}" type="parTrans" cxnId="{91136228-9373-4BB7-B36A-BFB04B6CF2EF}">
+      <dgm:prSet/>
+      <dgm:spPr/>
+    </dgm:pt>
+    <dgm:pt modelId="{F62D611B-3FA1-4852-A01E-BE1407C55316}" type="sibTrans" cxnId="{91136228-9373-4BB7-B36A-BFB04B6CF2EF}">
+      <dgm:prSet/>
+      <dgm:spPr/>
+    </dgm:pt>
+    <dgm:pt modelId="{825833CB-D478-4FF5-AD6F-E4AAA2BBAD81}">
+      <dgm:prSet phldrT="[Text]"/>
+      <dgm:spPr/>
+      <dgm:t>
+        <a:bodyPr/>
+        <a:lstStyle/>
+        <a:p>
+          <a:r>
+            <a:rPr lang="en-US" dirty="0"/>
+            <a:t>Provide safety, interactive, and recommendation capabilities </a:t>
+          </a:r>
+        </a:p>
+      </dgm:t>
+    </dgm:pt>
+    <dgm:pt modelId="{4AC12932-FC8D-4CC9-BFED-C2110CC4A750}" type="parTrans" cxnId="{E286429B-1AE4-4F88-A9A4-24506DCF3976}">
+      <dgm:prSet/>
+      <dgm:spPr/>
+    </dgm:pt>
+    <dgm:pt modelId="{42C8EB81-FD35-4E60-920E-AC928ADC1C2E}" type="sibTrans" cxnId="{E286429B-1AE4-4F88-A9A4-24506DCF3976}">
+      <dgm:prSet/>
+      <dgm:spPr/>
+    </dgm:pt>
+    <dgm:pt modelId="{1FA34FB3-5884-4F5B-BD5D-C48A96F3B9E6}" type="pres">
+      <dgm:prSet presAssocID="{742BCD6A-8A58-49BA-8A9D-354EBD5C41F7}" presName="linear" presStyleCnt="0">
         <dgm:presLayoutVars>
-          <dgm:orgChart val="1"/>
-          <dgm:chPref val="1"/>
-          <dgm:dir/>
-          <dgm:animOne val="branch"/>
           <dgm:animLvl val="lvl"/>
-          <dgm:resizeHandles/>
+          <dgm:resizeHandles val="exact"/>
         </dgm:presLayoutVars>
       </dgm:prSet>
       <dgm:spPr/>
     </dgm:pt>
+    <dgm:pt modelId="{FA131C84-2A0F-4F80-ACA7-EE36DC90ADF2}" type="pres">
+      <dgm:prSet presAssocID="{9F2A07D5-CFE3-49C5-90ED-113111463B74}" presName="parentText" presStyleLbl="node1" presStyleIdx="0" presStyleCnt="2">
+        <dgm:presLayoutVars>
+          <dgm:chMax val="0"/>
+          <dgm:bulletEnabled val="1"/>
+        </dgm:presLayoutVars>
+      </dgm:prSet>
+      <dgm:spPr/>
+    </dgm:pt>
+    <dgm:pt modelId="{584C03E4-05CB-4C6E-A56A-A8306877F043}" type="pres">
+      <dgm:prSet presAssocID="{9F2A07D5-CFE3-49C5-90ED-113111463B74}" presName="childText" presStyleLbl="revTx" presStyleIdx="0" presStyleCnt="2">
+        <dgm:presLayoutVars>
+          <dgm:bulletEnabled val="1"/>
+        </dgm:presLayoutVars>
+      </dgm:prSet>
+      <dgm:spPr/>
+    </dgm:pt>
+    <dgm:pt modelId="{5AC7C76A-8C0A-4A73-8045-9B899E19FD42}" type="pres">
+      <dgm:prSet presAssocID="{EE925F82-205C-4D99-B6F6-54D8E7C91EC9}" presName="parentText" presStyleLbl="node1" presStyleIdx="1" presStyleCnt="2">
+        <dgm:presLayoutVars>
+          <dgm:chMax val="0"/>
+          <dgm:bulletEnabled val="1"/>
+        </dgm:presLayoutVars>
+      </dgm:prSet>
+      <dgm:spPr/>
+    </dgm:pt>
+    <dgm:pt modelId="{71AC1C61-D52A-424D-8639-40B53318AE7F}" type="pres">
+      <dgm:prSet presAssocID="{EE925F82-205C-4D99-B6F6-54D8E7C91EC9}" presName="childText" presStyleLbl="revTx" presStyleIdx="1" presStyleCnt="2">
+        <dgm:presLayoutVars>
+          <dgm:bulletEnabled val="1"/>
+        </dgm:presLayoutVars>
+      </dgm:prSet>
+      <dgm:spPr/>
+    </dgm:pt>
   </dgm:ptLst>
   <dgm:cxnLst>
-    <dgm:cxn modelId="{CB5ECFBE-FD64-4A24-B2C6-3E0455DDDA0E}" type="presOf" srcId="{3D8B9BA6-8FC2-4F61-B55A-C2EAE7DF8B3A}" destId="{95A660C1-7304-419C-9B10-494FBA034F63}" srcOrd="0" destOrd="0" presId="urn:microsoft.com/office/officeart/2005/8/layout/orgChart1"/>
+    <dgm:cxn modelId="{9F63C724-8576-48AD-97EF-4AE8CCB1E68C}" type="presOf" srcId="{825833CB-D478-4FF5-AD6F-E4AAA2BBAD81}" destId="{584C03E4-05CB-4C6E-A56A-A8306877F043}" srcOrd="0" destOrd="2" presId="urn:microsoft.com/office/officeart/2005/8/layout/vList2"/>
+    <dgm:cxn modelId="{91136228-9373-4BB7-B36A-BFB04B6CF2EF}" srcId="{9F2A07D5-CFE3-49C5-90ED-113111463B74}" destId="{E7859D01-B14A-4980-9DB3-C1878CB7D08C}" srcOrd="1" destOrd="0" parTransId="{430AB2A9-7A95-495B-9A7C-6078E5BFE135}" sibTransId="{F62D611B-3FA1-4852-A01E-BE1407C55316}"/>
+    <dgm:cxn modelId="{18D1665B-D18D-4BCC-B3CE-DAE33B4AA80A}" type="presOf" srcId="{551E63CD-B471-4093-A979-BE90E2498678}" destId="{584C03E4-05CB-4C6E-A56A-A8306877F043}" srcOrd="0" destOrd="0" presId="urn:microsoft.com/office/officeart/2005/8/layout/vList2"/>
+    <dgm:cxn modelId="{9AD7395C-2292-45E3-A6D7-2FCD4EBEAD01}" type="presOf" srcId="{742BCD6A-8A58-49BA-8A9D-354EBD5C41F7}" destId="{1FA34FB3-5884-4F5B-BD5D-C48A96F3B9E6}" srcOrd="0" destOrd="0" presId="urn:microsoft.com/office/officeart/2005/8/layout/vList2"/>
+    <dgm:cxn modelId="{4E3FE041-FA8F-40C9-B880-025413EFE03C}" srcId="{742BCD6A-8A58-49BA-8A9D-354EBD5C41F7}" destId="{EE925F82-205C-4D99-B6F6-54D8E7C91EC9}" srcOrd="1" destOrd="0" parTransId="{6EF44F0B-950D-45ED-9486-3360061C2AF6}" sibTransId="{3584D9A4-25C3-4532-B388-810B9ED20B47}"/>
+    <dgm:cxn modelId="{56D10467-9154-4897-9C78-4DF7E76B833B}" srcId="{EE925F82-205C-4D99-B6F6-54D8E7C91EC9}" destId="{4FC06292-9372-4997-9D8B-CB795BD196EF}" srcOrd="2" destOrd="0" parTransId="{5084D200-375E-410B-A711-CC7F60EFC031}" sibTransId="{72AA9780-1B2A-4D30-8888-4CF30785F063}"/>
+    <dgm:cxn modelId="{820BEA6B-0520-4A35-80EB-0AAFDAD3E5E9}" type="presOf" srcId="{E7859D01-B14A-4980-9DB3-C1878CB7D08C}" destId="{584C03E4-05CB-4C6E-A56A-A8306877F043}" srcOrd="0" destOrd="1" presId="urn:microsoft.com/office/officeart/2005/8/layout/vList2"/>
+    <dgm:cxn modelId="{63000271-87ED-4C62-991C-2A24AEA650F5}" srcId="{9F2A07D5-CFE3-49C5-90ED-113111463B74}" destId="{551E63CD-B471-4093-A979-BE90E2498678}" srcOrd="0" destOrd="0" parTransId="{2D09BEC2-4C44-4D46-BE92-A62C797FFB30}" sibTransId="{A48A3CAE-D535-4E3C-A587-A4F4D6A05305}"/>
+    <dgm:cxn modelId="{50DADC83-4248-459A-8127-58EC7C6666E2}" type="presOf" srcId="{EE925F82-205C-4D99-B6F6-54D8E7C91EC9}" destId="{5AC7C76A-8C0A-4A73-8045-9B899E19FD42}" srcOrd="0" destOrd="0" presId="urn:microsoft.com/office/officeart/2005/8/layout/vList2"/>
+    <dgm:cxn modelId="{3565EE84-E7E8-458D-B7A9-6925E4BA83C6}" srcId="{EE925F82-205C-4D99-B6F6-54D8E7C91EC9}" destId="{D72181DA-6A6B-4D16-8127-CCD35B877485}" srcOrd="1" destOrd="0" parTransId="{04D98175-771E-4AC7-ADC3-BAB3CCE1517E}" sibTransId="{2E0A4F87-CDBD-4572-97E2-333DACD6DB56}"/>
+    <dgm:cxn modelId="{29F25992-5164-4A05-999D-A3484E7DEF83}" srcId="{EE925F82-205C-4D99-B6F6-54D8E7C91EC9}" destId="{80DFFCDB-39AA-40D2-AFDC-03E8AF287298}" srcOrd="0" destOrd="0" parTransId="{5C2DFB69-0FD6-47E2-BDBC-4914892E9EA8}" sibTransId="{B11A1312-A7CF-4CE0-9237-0B797A4DE5D4}"/>
+    <dgm:cxn modelId="{81A58B98-41DA-4037-A9F5-B83C07D769BE}" type="presOf" srcId="{9F2A07D5-CFE3-49C5-90ED-113111463B74}" destId="{FA131C84-2A0F-4F80-ACA7-EE36DC90ADF2}" srcOrd="0" destOrd="0" presId="urn:microsoft.com/office/officeart/2005/8/layout/vList2"/>
+    <dgm:cxn modelId="{E286429B-1AE4-4F88-A9A4-24506DCF3976}" srcId="{9F2A07D5-CFE3-49C5-90ED-113111463B74}" destId="{825833CB-D478-4FF5-AD6F-E4AAA2BBAD81}" srcOrd="2" destOrd="0" parTransId="{4AC12932-FC8D-4CC9-BFED-C2110CC4A750}" sibTransId="{42C8EB81-FD35-4E60-920E-AC928ADC1C2E}"/>
+    <dgm:cxn modelId="{21F72FA6-FBA7-4581-827B-6132C1AE1D80}" type="presOf" srcId="{80DFFCDB-39AA-40D2-AFDC-03E8AF287298}" destId="{71AC1C61-D52A-424D-8639-40B53318AE7F}" srcOrd="0" destOrd="0" presId="urn:microsoft.com/office/officeart/2005/8/layout/vList2"/>
+    <dgm:cxn modelId="{40F4DEBD-4CF8-4FA6-AAF3-7B6B8E85C24A}" type="presOf" srcId="{4FC06292-9372-4997-9D8B-CB795BD196EF}" destId="{71AC1C61-D52A-424D-8639-40B53318AE7F}" srcOrd="0" destOrd="2" presId="urn:microsoft.com/office/officeart/2005/8/layout/vList2"/>
+    <dgm:cxn modelId="{94EAC7D5-FBDC-4D73-928F-3F02BC4B55C7}" srcId="{742BCD6A-8A58-49BA-8A9D-354EBD5C41F7}" destId="{9F2A07D5-CFE3-49C5-90ED-113111463B74}" srcOrd="0" destOrd="0" parTransId="{3484B0A8-68B1-484E-BDE6-5E2980B85848}" sibTransId="{92C21145-145C-475A-A85C-2E6774D81D59}"/>
+    <dgm:cxn modelId="{DCF308FF-9A7A-40F6-81C7-310F69D90E5B}" type="presOf" srcId="{D72181DA-6A6B-4D16-8127-CCD35B877485}" destId="{71AC1C61-D52A-424D-8639-40B53318AE7F}" srcOrd="0" destOrd="1" presId="urn:microsoft.com/office/officeart/2005/8/layout/vList2"/>
+    <dgm:cxn modelId="{6E156BDF-2E68-40CC-AD7F-0544A062EABB}" type="presParOf" srcId="{1FA34FB3-5884-4F5B-BD5D-C48A96F3B9E6}" destId="{FA131C84-2A0F-4F80-ACA7-EE36DC90ADF2}" srcOrd="0" destOrd="0" presId="urn:microsoft.com/office/officeart/2005/8/layout/vList2"/>
+    <dgm:cxn modelId="{214906BC-428D-42DC-B980-C314E2980797}" type="presParOf" srcId="{1FA34FB3-5884-4F5B-BD5D-C48A96F3B9E6}" destId="{584C03E4-05CB-4C6E-A56A-A8306877F043}" srcOrd="1" destOrd="0" presId="urn:microsoft.com/office/officeart/2005/8/layout/vList2"/>
+    <dgm:cxn modelId="{F72B4B4E-BB2D-441E-929F-C58A7DA822BD}" type="presParOf" srcId="{1FA34FB3-5884-4F5B-BD5D-C48A96F3B9E6}" destId="{5AC7C76A-8C0A-4A73-8045-9B899E19FD42}" srcOrd="2" destOrd="0" presId="urn:microsoft.com/office/officeart/2005/8/layout/vList2"/>
+    <dgm:cxn modelId="{FA445A86-AE77-4E30-AC29-981D93A1A600}" type="presParOf" srcId="{1FA34FB3-5884-4F5B-BD5D-C48A96F3B9E6}" destId="{71AC1C61-D52A-424D-8639-40B53318AE7F}" srcOrd="3" destOrd="0" presId="urn:microsoft.com/office/officeart/2005/8/layout/vList2"/>
   </dgm:cxnLst>
   <dgm:bg/>
   <dgm:whole/>
@@ -19401,6 +19669,352 @@
       <dsp:cNvGrpSpPr/>
     </dsp:nvGrpSpPr>
     <dsp:grpSpPr/>
+    <dsp:sp modelId="{FA131C84-2A0F-4F80-ACA7-EE36DC90ADF2}">
+      <dsp:nvSpPr>
+        <dsp:cNvPr id="0" name=""/>
+        <dsp:cNvSpPr/>
+      </dsp:nvSpPr>
+      <dsp:spPr>
+        <a:xfrm>
+          <a:off x="0" y="59483"/>
+          <a:ext cx="10581748" cy="772200"/>
+        </a:xfrm>
+        <a:prstGeom prst="roundRect">
+          <a:avLst/>
+        </a:prstGeom>
+        <a:solidFill>
+          <a:schemeClr val="accent1">
+            <a:hueOff val="0"/>
+            <a:satOff val="0"/>
+            <a:lumOff val="0"/>
+            <a:alphaOff val="0"/>
+          </a:schemeClr>
+        </a:solidFill>
+        <a:ln w="19050" cap="rnd" cmpd="sng" algn="ctr">
+          <a:solidFill>
+            <a:schemeClr val="lt1">
+              <a:hueOff val="0"/>
+              <a:satOff val="0"/>
+              <a:lumOff val="0"/>
+              <a:alphaOff val="0"/>
+            </a:schemeClr>
+          </a:solidFill>
+          <a:prstDash val="solid"/>
+        </a:ln>
+        <a:effectLst/>
+      </dsp:spPr>
+      <dsp:style>
+        <a:lnRef idx="2">
+          <a:scrgbClr r="0" g="0" b="0"/>
+        </a:lnRef>
+        <a:fillRef idx="1">
+          <a:scrgbClr r="0" g="0" b="0"/>
+        </a:fillRef>
+        <a:effectRef idx="0">
+          <a:scrgbClr r="0" g="0" b="0"/>
+        </a:effectRef>
+        <a:fontRef idx="minor">
+          <a:schemeClr val="lt1"/>
+        </a:fontRef>
+      </dsp:style>
+      <dsp:txBody>
+        <a:bodyPr spcFirstLastPara="0" vert="horz" wrap="square" lIns="125730" tIns="125730" rIns="125730" bIns="125730" numCol="1" spcCol="1270" anchor="ctr" anchorCtr="0">
+          <a:noAutofit/>
+        </a:bodyPr>
+        <a:lstStyle/>
+        <a:p>
+          <a:pPr marL="0" lvl="0" indent="0" algn="l" defTabSz="1466850">
+            <a:lnSpc>
+              <a:spcPct val="90000"/>
+            </a:lnSpc>
+            <a:spcBef>
+              <a:spcPct val="0"/>
+            </a:spcBef>
+            <a:spcAft>
+              <a:spcPct val="35000"/>
+            </a:spcAft>
+            <a:buNone/>
+          </a:pPr>
+          <a:r>
+            <a:rPr lang="en-US" sz="3300" kern="1200" dirty="0"/>
+            <a:t>Advantages</a:t>
+          </a:r>
+        </a:p>
+      </dsp:txBody>
+      <dsp:txXfrm>
+        <a:off x="37696" y="97179"/>
+        <a:ext cx="10506356" cy="696808"/>
+      </dsp:txXfrm>
+    </dsp:sp>
+    <dsp:sp modelId="{584C03E4-05CB-4C6E-A56A-A8306877F043}">
+      <dsp:nvSpPr>
+        <dsp:cNvPr id="0" name=""/>
+        <dsp:cNvSpPr/>
+      </dsp:nvSpPr>
+      <dsp:spPr>
+        <a:xfrm>
+          <a:off x="0" y="831683"/>
+          <a:ext cx="10581748" cy="1297890"/>
+        </a:xfrm>
+        <a:prstGeom prst="rect">
+          <a:avLst/>
+        </a:prstGeom>
+        <a:noFill/>
+        <a:ln>
+          <a:noFill/>
+        </a:ln>
+        <a:effectLst/>
+      </dsp:spPr>
+      <dsp:style>
+        <a:lnRef idx="0">
+          <a:scrgbClr r="0" g="0" b="0"/>
+        </a:lnRef>
+        <a:fillRef idx="0">
+          <a:scrgbClr r="0" g="0" b="0"/>
+        </a:fillRef>
+        <a:effectRef idx="0">
+          <a:scrgbClr r="0" g="0" b="0"/>
+        </a:effectRef>
+        <a:fontRef idx="minor"/>
+      </dsp:style>
+      <dsp:txBody>
+        <a:bodyPr spcFirstLastPara="0" vert="horz" wrap="square" lIns="335971" tIns="41910" rIns="234696" bIns="41910" numCol="1" spcCol="1270" anchor="t" anchorCtr="0">
+          <a:noAutofit/>
+        </a:bodyPr>
+        <a:lstStyle/>
+        <a:p>
+          <a:pPr marL="228600" lvl="1" indent="-228600" algn="l" defTabSz="1155700">
+            <a:lnSpc>
+              <a:spcPct val="90000"/>
+            </a:lnSpc>
+            <a:spcBef>
+              <a:spcPct val="0"/>
+            </a:spcBef>
+            <a:spcAft>
+              <a:spcPct val="20000"/>
+            </a:spcAft>
+            <a:buChar char="•"/>
+          </a:pPr>
+          <a:r>
+            <a:rPr lang="en-US" sz="2600" kern="1200" dirty="0"/>
+            <a:t>Reduce costs and increase automation</a:t>
+          </a:r>
+        </a:p>
+        <a:p>
+          <a:pPr marL="228600" lvl="1" indent="-228600" algn="l" defTabSz="1155700">
+            <a:lnSpc>
+              <a:spcPct val="90000"/>
+            </a:lnSpc>
+            <a:spcBef>
+              <a:spcPct val="0"/>
+            </a:spcBef>
+            <a:spcAft>
+              <a:spcPct val="20000"/>
+            </a:spcAft>
+            <a:buChar char="•"/>
+          </a:pPr>
+          <a:r>
+            <a:rPr lang="en-US" sz="2600" kern="1200" dirty="0"/>
+            <a:t>Manage complex decision processes</a:t>
+          </a:r>
+        </a:p>
+        <a:p>
+          <a:pPr marL="228600" lvl="1" indent="-228600" algn="l" defTabSz="1155700">
+            <a:lnSpc>
+              <a:spcPct val="90000"/>
+            </a:lnSpc>
+            <a:spcBef>
+              <a:spcPct val="0"/>
+            </a:spcBef>
+            <a:spcAft>
+              <a:spcPct val="20000"/>
+            </a:spcAft>
+            <a:buChar char="•"/>
+          </a:pPr>
+          <a:r>
+            <a:rPr lang="en-US" sz="2600" kern="1200" dirty="0"/>
+            <a:t>Provide safety, interactive, and recommendation capabilities </a:t>
+          </a:r>
+        </a:p>
+      </dsp:txBody>
+      <dsp:txXfrm>
+        <a:off x="0" y="831683"/>
+        <a:ext cx="10581748" cy="1297890"/>
+      </dsp:txXfrm>
+    </dsp:sp>
+    <dsp:sp modelId="{5AC7C76A-8C0A-4A73-8045-9B899E19FD42}">
+      <dsp:nvSpPr>
+        <dsp:cNvPr id="0" name=""/>
+        <dsp:cNvSpPr/>
+      </dsp:nvSpPr>
+      <dsp:spPr>
+        <a:xfrm>
+          <a:off x="0" y="2129574"/>
+          <a:ext cx="10581748" cy="772200"/>
+        </a:xfrm>
+        <a:prstGeom prst="roundRect">
+          <a:avLst/>
+        </a:prstGeom>
+        <a:solidFill>
+          <a:schemeClr val="accent1">
+            <a:hueOff val="0"/>
+            <a:satOff val="0"/>
+            <a:lumOff val="0"/>
+            <a:alphaOff val="0"/>
+          </a:schemeClr>
+        </a:solidFill>
+        <a:ln w="19050" cap="rnd" cmpd="sng" algn="ctr">
+          <a:solidFill>
+            <a:schemeClr val="lt1">
+              <a:hueOff val="0"/>
+              <a:satOff val="0"/>
+              <a:lumOff val="0"/>
+              <a:alphaOff val="0"/>
+            </a:schemeClr>
+          </a:solidFill>
+          <a:prstDash val="solid"/>
+        </a:ln>
+        <a:effectLst/>
+      </dsp:spPr>
+      <dsp:style>
+        <a:lnRef idx="2">
+          <a:scrgbClr r="0" g="0" b="0"/>
+        </a:lnRef>
+        <a:fillRef idx="1">
+          <a:scrgbClr r="0" g="0" b="0"/>
+        </a:fillRef>
+        <a:effectRef idx="0">
+          <a:scrgbClr r="0" g="0" b="0"/>
+        </a:effectRef>
+        <a:fontRef idx="minor">
+          <a:schemeClr val="lt1"/>
+        </a:fontRef>
+      </dsp:style>
+      <dsp:txBody>
+        <a:bodyPr spcFirstLastPara="0" vert="horz" wrap="square" lIns="125730" tIns="125730" rIns="125730" bIns="125730" numCol="1" spcCol="1270" anchor="ctr" anchorCtr="0">
+          <a:noAutofit/>
+        </a:bodyPr>
+        <a:lstStyle/>
+        <a:p>
+          <a:pPr marL="0" lvl="0" indent="0" algn="l" defTabSz="1466850">
+            <a:lnSpc>
+              <a:spcPct val="90000"/>
+            </a:lnSpc>
+            <a:spcBef>
+              <a:spcPct val="0"/>
+            </a:spcBef>
+            <a:spcAft>
+              <a:spcPct val="35000"/>
+            </a:spcAft>
+            <a:buNone/>
+          </a:pPr>
+          <a:r>
+            <a:rPr lang="en-US" sz="3300" kern="1200" dirty="0"/>
+            <a:t>Disadvantages</a:t>
+          </a:r>
+        </a:p>
+      </dsp:txBody>
+      <dsp:txXfrm>
+        <a:off x="37696" y="2167270"/>
+        <a:ext cx="10506356" cy="696808"/>
+      </dsp:txXfrm>
+    </dsp:sp>
+    <dsp:sp modelId="{71AC1C61-D52A-424D-8639-40B53318AE7F}">
+      <dsp:nvSpPr>
+        <dsp:cNvPr id="0" name=""/>
+        <dsp:cNvSpPr/>
+      </dsp:nvSpPr>
+      <dsp:spPr>
+        <a:xfrm>
+          <a:off x="0" y="2901774"/>
+          <a:ext cx="10581748" cy="1297890"/>
+        </a:xfrm>
+        <a:prstGeom prst="rect">
+          <a:avLst/>
+        </a:prstGeom>
+        <a:noFill/>
+        <a:ln>
+          <a:noFill/>
+        </a:ln>
+        <a:effectLst/>
+      </dsp:spPr>
+      <dsp:style>
+        <a:lnRef idx="0">
+          <a:scrgbClr r="0" g="0" b="0"/>
+        </a:lnRef>
+        <a:fillRef idx="0">
+          <a:scrgbClr r="0" g="0" b="0"/>
+        </a:fillRef>
+        <a:effectRef idx="0">
+          <a:scrgbClr r="0" g="0" b="0"/>
+        </a:effectRef>
+        <a:fontRef idx="minor"/>
+      </dsp:style>
+      <dsp:txBody>
+        <a:bodyPr spcFirstLastPara="0" vert="horz" wrap="square" lIns="335971" tIns="41910" rIns="234696" bIns="41910" numCol="1" spcCol="1270" anchor="t" anchorCtr="0">
+          <a:noAutofit/>
+        </a:bodyPr>
+        <a:lstStyle/>
+        <a:p>
+          <a:pPr marL="228600" lvl="1" indent="-228600" algn="l" defTabSz="1155700">
+            <a:lnSpc>
+              <a:spcPct val="90000"/>
+            </a:lnSpc>
+            <a:spcBef>
+              <a:spcPct val="0"/>
+            </a:spcBef>
+            <a:spcAft>
+              <a:spcPct val="20000"/>
+            </a:spcAft>
+            <a:buChar char="•"/>
+          </a:pPr>
+          <a:r>
+            <a:rPr lang="en-US" sz="2600" kern="1200" dirty="0"/>
+            <a:t>Large models are ambiguous, drift, and require re-training</a:t>
+          </a:r>
+        </a:p>
+        <a:p>
+          <a:pPr marL="228600" lvl="1" indent="-228600" algn="l" defTabSz="1155700">
+            <a:lnSpc>
+              <a:spcPct val="90000"/>
+            </a:lnSpc>
+            <a:spcBef>
+              <a:spcPct val="0"/>
+            </a:spcBef>
+            <a:spcAft>
+              <a:spcPct val="20000"/>
+            </a:spcAft>
+            <a:buChar char="•"/>
+          </a:pPr>
+          <a:r>
+            <a:rPr lang="en-US" sz="2600" kern="1200" dirty="0"/>
+            <a:t>Secure model design is open problem</a:t>
+          </a:r>
+        </a:p>
+        <a:p>
+          <a:pPr marL="228600" lvl="1" indent="-228600" algn="l" defTabSz="1155700">
+            <a:lnSpc>
+              <a:spcPct val="90000"/>
+            </a:lnSpc>
+            <a:spcBef>
+              <a:spcPct val="0"/>
+            </a:spcBef>
+            <a:spcAft>
+              <a:spcPct val="20000"/>
+            </a:spcAft>
+            <a:buChar char="•"/>
+          </a:pPr>
+          <a:r>
+            <a:rPr lang="en-US" sz="2600" kern="1200" dirty="0"/>
+            <a:t>Dynamic environments are very complex</a:t>
+          </a:r>
+        </a:p>
+      </dsp:txBody>
+      <dsp:txXfrm>
+        <a:off x="0" y="2901774"/>
+        <a:ext cx="10581748" cy="1297890"/>
+      </dsp:txXfrm>
+    </dsp:sp>
   </dsp:spTree>
 </dsp:drawing>
 </file>
@@ -23680,12 +24294,12 @@
 </file>
 
 <file path=ppt/diagrams/layout7.xml><?xml version="1.0" encoding="utf-8"?>
-<dgm:layoutDef xmlns:dgm="http://schemas.openxmlformats.org/drawingml/2006/diagram" xmlns:a="http://schemas.openxmlformats.org/drawingml/2006/main" uniqueId="urn:microsoft.com/office/officeart/2005/8/layout/orgChart1">
+<dgm:layoutDef xmlns:dgm="http://schemas.openxmlformats.org/drawingml/2006/diagram" xmlns:a="http://schemas.openxmlformats.org/drawingml/2006/main" uniqueId="urn:microsoft.com/office/officeart/2005/8/layout/vList2">
   <dgm:title val=""/>
   <dgm:desc val=""/>
   <dgm:catLst>
-    <dgm:cat type="hierarchy" pri="1000"/>
-    <dgm:cat type="convert" pri="6000"/>
+    <dgm:cat type="list" pri="3000"/>
+    <dgm:cat type="convert" pri="1000"/>
   </dgm:catLst>
   <dgm:sampData>
     <dgm:dataModel>
@@ -23694,25 +24308,21 @@
         <dgm:pt modelId="1">
           <dgm:prSet phldr="1"/>
         </dgm:pt>
-        <dgm:pt modelId="2" type="asst">
+        <dgm:pt modelId="11">
           <dgm:prSet phldr="1"/>
         </dgm:pt>
-        <dgm:pt modelId="3">
+        <dgm:pt modelId="2">
           <dgm:prSet phldr="1"/>
         </dgm:pt>
-        <dgm:pt modelId="4">
-          <dgm:prSet phldr="1"/>
-        </dgm:pt>
-        <dgm:pt modelId="5">
+        <dgm:pt modelId="21">
           <dgm:prSet phldr="1"/>
         </dgm:pt>
       </dgm:ptLst>
       <dgm:cxnLst>
-        <dgm:cxn modelId="5" srcId="0" destId="1" srcOrd="0" destOrd="0"/>
-        <dgm:cxn modelId="6" srcId="1" destId="2" srcOrd="0" destOrd="0"/>
-        <dgm:cxn modelId="7" srcId="1" destId="3" srcOrd="1" destOrd="0"/>
-        <dgm:cxn modelId="8" srcId="1" destId="4" srcOrd="2" destOrd="0"/>
-        <dgm:cxn modelId="9" srcId="1" destId="5" srcOrd="3" destOrd="0"/>
+        <dgm:cxn modelId="4" srcId="0" destId="1" srcOrd="0" destOrd="0"/>
+        <dgm:cxn modelId="5" srcId="0" destId="2" srcOrd="1" destOrd="0"/>
+        <dgm:cxn modelId="12" srcId="1" destId="11" srcOrd="0" destOrd="0"/>
+        <dgm:cxn modelId="23" srcId="2" destId="21" srcOrd="0" destOrd="0"/>
       </dgm:cxnLst>
       <dgm:bg/>
       <dgm:whole/>
@@ -23723,13 +24333,11 @@
       <dgm:ptLst>
         <dgm:pt modelId="0" type="doc"/>
         <dgm:pt modelId="1"/>
-        <dgm:pt modelId="12"/>
-        <dgm:pt modelId="13"/>
+        <dgm:pt modelId="2"/>
       </dgm:ptLst>
       <dgm:cxnLst>
-        <dgm:cxn modelId="2" srcId="0" destId="1" srcOrd="0" destOrd="0"/>
-        <dgm:cxn modelId="16" srcId="1" destId="12" srcOrd="1" destOrd="0"/>
-        <dgm:cxn modelId="17" srcId="1" destId="13" srcOrd="2" destOrd="0"/>
+        <dgm:cxn modelId="3" srcId="0" destId="1" srcOrd="0" destOrd="0"/>
+        <dgm:cxn modelId="4" srcId="0" destId="2" srcOrd="1" destOrd="0"/>
       </dgm:cxnLst>
       <dgm:bg/>
       <dgm:whole/>
@@ -23740,1086 +24348,113 @@
       <dgm:ptLst>
         <dgm:pt modelId="0" type="doc"/>
         <dgm:pt modelId="1"/>
-        <dgm:pt modelId="11" type="asst"/>
-        <dgm:pt modelId="12"/>
-        <dgm:pt modelId="13"/>
-        <dgm:pt modelId="14"/>
+        <dgm:pt modelId="2"/>
+        <dgm:pt modelId="3"/>
+        <dgm:pt modelId="4"/>
       </dgm:ptLst>
       <dgm:cxnLst>
-        <dgm:cxn modelId="2" srcId="0" destId="1" srcOrd="0" destOrd="0"/>
-        <dgm:cxn modelId="15" srcId="1" destId="11" srcOrd="0" destOrd="0"/>
-        <dgm:cxn modelId="16" srcId="1" destId="12" srcOrd="1" destOrd="0"/>
-        <dgm:cxn modelId="17" srcId="1" destId="13" srcOrd="2" destOrd="0"/>
-        <dgm:cxn modelId="18" srcId="1" destId="14" srcOrd="2" destOrd="0"/>
+        <dgm:cxn modelId="5" srcId="0" destId="1" srcOrd="0" destOrd="0"/>
+        <dgm:cxn modelId="6" srcId="0" destId="2" srcOrd="1" destOrd="0"/>
+        <dgm:cxn modelId="7" srcId="0" destId="3" srcOrd="2" destOrd="0"/>
+        <dgm:cxn modelId="8" srcId="0" destId="4" srcOrd="3" destOrd="0"/>
       </dgm:cxnLst>
       <dgm:bg/>
       <dgm:whole/>
     </dgm:dataModel>
   </dgm:clrData>
-  <dgm:layoutNode name="hierChild1">
+  <dgm:layoutNode name="linear">
     <dgm:varLst>
-      <dgm:orgChart val="1"/>
-      <dgm:chPref val="1"/>
-      <dgm:dir/>
-      <dgm:animOne val="branch"/>
       <dgm:animLvl val="lvl"/>
-      <dgm:resizeHandles/>
+      <dgm:resizeHandles val="exact"/>
     </dgm:varLst>
-    <dgm:choose name="Name0">
-      <dgm:if name="Name1" func="var" arg="dir" op="equ" val="norm">
-        <dgm:alg type="hierChild">
-          <dgm:param type="linDir" val="fromL"/>
-        </dgm:alg>
-      </dgm:if>
-      <dgm:else name="Name2">
-        <dgm:alg type="hierChild">
-          <dgm:param type="linDir" val="fromR"/>
-        </dgm:alg>
-      </dgm:else>
-    </dgm:choose>
+    <dgm:alg type="lin">
+      <dgm:param type="linDir" val="fromT"/>
+      <dgm:param type="vertAlign" val="mid"/>
+    </dgm:alg>
     <dgm:shape xmlns:r="http://schemas.openxmlformats.org/officeDocument/2006/relationships" r:blip="">
       <dgm:adjLst/>
     </dgm:shape>
     <dgm:presOf/>
     <dgm:constrLst>
-      <dgm:constr type="w" for="des" forName="rootComposite1" refType="w" fact="10"/>
-      <dgm:constr type="h" for="des" forName="rootComposite1" refType="w" refFor="des" refForName="rootComposite1" fact="0.5"/>
-      <dgm:constr type="w" for="des" forName="rootComposite" refType="w" fact="10"/>
-      <dgm:constr type="h" for="des" forName="rootComposite" refType="w" refFor="des" refForName="rootComposite1" fact="0.5"/>
-      <dgm:constr type="w" for="des" forName="rootComposite3" refType="w" fact="10"/>
-      <dgm:constr type="h" for="des" forName="rootComposite3" refType="w" refFor="des" refForName="rootComposite1" fact="0.5"/>
-      <dgm:constr type="primFontSz" for="des" ptType="node" op="equ"/>
-      <dgm:constr type="sp" for="des" op="equ"/>
-      <dgm:constr type="sp" for="des" forName="hierRoot1" refType="w" refFor="des" refForName="rootComposite1" fact="0.21"/>
-      <dgm:constr type="sp" for="des" forName="hierRoot2" refType="sp" refFor="des" refForName="hierRoot1"/>
-      <dgm:constr type="sp" for="des" forName="hierRoot3" refType="sp" refFor="des" refForName="hierRoot1"/>
-      <dgm:constr type="sibSp" refType="w" refFor="des" refForName="rootComposite1" fact="0.21"/>
-      <dgm:constr type="sibSp" for="des" forName="hierChild2" refType="sibSp"/>
-      <dgm:constr type="sibSp" for="des" forName="hierChild3" refType="sibSp"/>
-      <dgm:constr type="sibSp" for="des" forName="hierChild4" refType="sibSp"/>
-      <dgm:constr type="sibSp" for="des" forName="hierChild5" refType="sibSp"/>
-      <dgm:constr type="sibSp" for="des" forName="hierChild6" refType="sibSp"/>
-      <dgm:constr type="sibSp" for="des" forName="hierChild7" refType="sibSp"/>
-      <dgm:constr type="secSibSp" refType="w" refFor="des" refForName="rootComposite1" fact="0.21"/>
-      <dgm:constr type="secSibSp" for="des" forName="hierChild2" refType="secSibSp"/>
-      <dgm:constr type="secSibSp" for="des" forName="hierChild3" refType="secSibSp"/>
-      <dgm:constr type="secSibSp" for="des" forName="hierChild4" refType="secSibSp"/>
-      <dgm:constr type="secSibSp" for="des" forName="hierChild5" refType="secSibSp"/>
-      <dgm:constr type="secSibSp" for="des" forName="hierChild6" refType="secSibSp"/>
-      <dgm:constr type="secSibSp" for="des" forName="hierChild7" refType="secSibSp"/>
+      <dgm:constr type="w" for="ch" forName="parentText" refType="w"/>
+      <dgm:constr type="h" for="ch" forName="parentText" refType="primFontSz" refFor="ch" refForName="parentText" fact="0.52"/>
+      <dgm:constr type="w" for="ch" forName="childText" refType="w"/>
+      <dgm:constr type="h" for="ch" forName="childText" refType="primFontSz" refFor="ch" refForName="parentText" fact="0.46"/>
+      <dgm:constr type="h" for="ch" forName="parentText" op="equ"/>
+      <dgm:constr type="primFontSz" for="ch" forName="parentText" op="equ" val="65"/>
+      <dgm:constr type="primFontSz" for="ch" forName="childText" refType="primFontSz" refFor="ch" refForName="parentText" op="equ"/>
+      <dgm:constr type="h" for="ch" forName="spacer" refType="primFontSz" refFor="ch" refForName="parentText" fact="0.08"/>
     </dgm:constrLst>
-    <dgm:ruleLst/>
-    <dgm:forEach name="Name3" axis="ch">
-      <dgm:forEach name="Name4" axis="self" ptType="node">
-        <dgm:layoutNode name="hierRoot1">
-          <dgm:varLst>
-            <dgm:hierBranch val="init"/>
-          </dgm:varLst>
-          <dgm:choose name="Name5">
-            <dgm:if name="Name6" func="var" arg="hierBranch" op="equ" val="l">
-              <dgm:choose name="Name7">
-                <dgm:if name="Name8" axis="ch" ptType="asst" func="cnt" op="gte" val="1">
-                  <dgm:alg type="hierRoot">
-                    <dgm:param type="hierAlign" val="tR"/>
-                  </dgm:alg>
-                  <dgm:constrLst>
-                    <dgm:constr type="alignOff" val="0.65"/>
-                  </dgm:constrLst>
-                </dgm:if>
-                <dgm:else name="Name9">
-                  <dgm:alg type="hierRoot">
-                    <dgm:param type="hierAlign" val="tR"/>
-                  </dgm:alg>
-                  <dgm:constrLst>
-                    <dgm:constr type="alignOff" val="0.25"/>
-                  </dgm:constrLst>
-                </dgm:else>
-              </dgm:choose>
-            </dgm:if>
-            <dgm:if name="Name10" func="var" arg="hierBranch" op="equ" val="r">
-              <dgm:choose name="Name11">
-                <dgm:if name="Name12" axis="ch" ptType="asst" func="cnt" op="gte" val="1">
-                  <dgm:alg type="hierRoot">
-                    <dgm:param type="hierAlign" val="tL"/>
-                  </dgm:alg>
-                  <dgm:constrLst>
-                    <dgm:constr type="alignOff" val="0.65"/>
-                  </dgm:constrLst>
-                </dgm:if>
-                <dgm:else name="Name13">
-                  <dgm:alg type="hierRoot">
-                    <dgm:param type="hierAlign" val="tL"/>
-                  </dgm:alg>
-                  <dgm:constrLst>
-                    <dgm:constr type="alignOff" val="0.25"/>
-                  </dgm:constrLst>
-                </dgm:else>
-              </dgm:choose>
-            </dgm:if>
-            <dgm:if name="Name14" func="var" arg="hierBranch" op="equ" val="hang">
-              <dgm:alg type="hierRoot"/>
-              <dgm:constrLst>
-                <dgm:constr type="alignOff" val="0.65"/>
-              </dgm:constrLst>
-            </dgm:if>
-            <dgm:else name="Name15">
-              <dgm:alg type="hierRoot"/>
-              <dgm:constrLst>
-                <dgm:constr type="alignOff"/>
-                <dgm:constr type="bendDist" for="des" ptType="parTrans" refType="sp" fact="0.5"/>
-              </dgm:constrLst>
-            </dgm:else>
-          </dgm:choose>
-          <dgm:shape xmlns:r="http://schemas.openxmlformats.org/officeDocument/2006/relationships" r:blip="">
-            <dgm:adjLst/>
-          </dgm:shape>
-          <dgm:presOf/>
-          <dgm:ruleLst/>
-          <dgm:layoutNode name="rootComposite1">
-            <dgm:alg type="composite"/>
-            <dgm:shape xmlns:r="http://schemas.openxmlformats.org/officeDocument/2006/relationships" r:blip="">
+    <dgm:ruleLst>
+      <dgm:rule type="primFontSz" for="ch" forName="parentText" val="5" fact="NaN" max="NaN"/>
+    </dgm:ruleLst>
+    <dgm:forEach name="Name0" axis="ch" ptType="node">
+      <dgm:layoutNode name="parentText" styleLbl="node1">
+        <dgm:varLst>
+          <dgm:chMax val="0"/>
+          <dgm:bulletEnabled val="1"/>
+        </dgm:varLst>
+        <dgm:alg type="tx">
+          <dgm:param type="parTxLTRAlign" val="l"/>
+          <dgm:param type="parTxRTLAlign" val="r"/>
+        </dgm:alg>
+        <dgm:shape xmlns:r="http://schemas.openxmlformats.org/officeDocument/2006/relationships" type="roundRect" r:blip="">
+          <dgm:adjLst/>
+        </dgm:shape>
+        <dgm:presOf axis="self"/>
+        <dgm:constrLst>
+          <dgm:constr type="tMarg" refType="primFontSz" fact="0.3"/>
+          <dgm:constr type="bMarg" refType="primFontSz" fact="0.3"/>
+          <dgm:constr type="lMarg" refType="primFontSz" fact="0.3"/>
+          <dgm:constr type="rMarg" refType="primFontSz" fact="0.3"/>
+        </dgm:constrLst>
+        <dgm:ruleLst>
+          <dgm:rule type="h" val="INF" fact="NaN" max="NaN"/>
+        </dgm:ruleLst>
+      </dgm:layoutNode>
+      <dgm:choose name="Name1">
+        <dgm:if name="Name2" axis="ch" ptType="node" func="cnt" op="gte" val="1">
+          <dgm:layoutNode name="childText" styleLbl="revTx">
+            <dgm:varLst>
+              <dgm:bulletEnabled val="1"/>
+            </dgm:varLst>
+            <dgm:alg type="tx">
+              <dgm:param type="stBulletLvl" val="1"/>
+              <dgm:param type="lnSpAfChP" val="20"/>
+            </dgm:alg>
+            <dgm:shape xmlns:r="http://schemas.openxmlformats.org/officeDocument/2006/relationships" type="rect" r:blip="">
               <dgm:adjLst/>
             </dgm:shape>
-            <dgm:presOf axis="self" ptType="node" cnt="1"/>
-            <dgm:choose name="Name16">
-              <dgm:if name="Name17" func="var" arg="hierBranch" op="equ" val="init">
-                <dgm:constrLst>
-                  <dgm:constr type="l" for="ch" forName="rootText1"/>
-                  <dgm:constr type="t" for="ch" forName="rootText1"/>
-                  <dgm:constr type="w" for="ch" forName="rootText1" refType="w"/>
-                  <dgm:constr type="h" for="ch" forName="rootText1" refType="h"/>
-                  <dgm:constr type="l" for="ch" forName="rootConnector1"/>
-                  <dgm:constr type="t" for="ch" forName="rootConnector1"/>
-                  <dgm:constr type="w" for="ch" forName="rootConnector1" refType="w" refFor="ch" refForName="rootText1" fact="0.2"/>
-                  <dgm:constr type="h" for="ch" forName="rootConnector1" refType="h" refFor="ch" refForName="rootText1"/>
-                </dgm:constrLst>
-              </dgm:if>
-              <dgm:if name="Name18" func="var" arg="hierBranch" op="equ" val="l">
-                <dgm:constrLst>
-                  <dgm:constr type="l" for="ch" forName="rootText1"/>
-                  <dgm:constr type="t" for="ch" forName="rootText1"/>
-                  <dgm:constr type="w" for="ch" forName="rootText1" refType="w"/>
-                  <dgm:constr type="h" for="ch" forName="rootText1" refType="h"/>
-                  <dgm:constr type="r" for="ch" forName="rootConnector1" refType="w"/>
-                  <dgm:constr type="t" for="ch" forName="rootConnector1"/>
-                  <dgm:constr type="w" for="ch" forName="rootConnector1" refType="w" refFor="ch" refForName="rootText1" fact="0.2"/>
-                  <dgm:constr type="h" for="ch" forName="rootConnector1" refType="h" refFor="ch" refForName="rootText1"/>
-                </dgm:constrLst>
-              </dgm:if>
-              <dgm:if name="Name19" func="var" arg="hierBranch" op="equ" val="r">
-                <dgm:constrLst>
-                  <dgm:constr type="l" for="ch" forName="rootText1"/>
-                  <dgm:constr type="t" for="ch" forName="rootText1"/>
-                  <dgm:constr type="w" for="ch" forName="rootText1" refType="w"/>
-                  <dgm:constr type="h" for="ch" forName="rootText1" refType="h"/>
-                  <dgm:constr type="l" for="ch" forName="rootConnector1"/>
-                  <dgm:constr type="t" for="ch" forName="rootConnector1"/>
-                  <dgm:constr type="w" for="ch" forName="rootConnector1" refType="w" refFor="ch" refForName="rootText1" fact="0.2"/>
-                  <dgm:constr type="h" for="ch" forName="rootConnector1" refType="h" refFor="ch" refForName="rootText1"/>
-                </dgm:constrLst>
-              </dgm:if>
-              <dgm:else name="Name20">
-                <dgm:constrLst>
-                  <dgm:constr type="l" for="ch" forName="rootText1"/>
-                  <dgm:constr type="t" for="ch" forName="rootText1"/>
-                  <dgm:constr type="w" for="ch" forName="rootText1" refType="w"/>
-                  <dgm:constr type="h" for="ch" forName="rootText1" refType="h"/>
-                  <dgm:constr type="r" for="ch" forName="rootConnector1" refType="w"/>
-                  <dgm:constr type="t" for="ch" forName="rootConnector1"/>
-                  <dgm:constr type="w" for="ch" forName="rootConnector1" refType="w" refFor="ch" refForName="rootText1" fact="0.2"/>
-                  <dgm:constr type="h" for="ch" forName="rootConnector1" refType="h" refFor="ch" refForName="rootText1"/>
-                </dgm:constrLst>
-              </dgm:else>
-            </dgm:choose>
-            <dgm:ruleLst/>
-            <dgm:layoutNode name="rootText1" styleLbl="node0">
-              <dgm:varLst>
-                <dgm:chPref val="3"/>
-              </dgm:varLst>
-              <dgm:alg type="tx"/>
-              <dgm:shape xmlns:r="http://schemas.openxmlformats.org/officeDocument/2006/relationships" type="rect" r:blip="">
-                <dgm:adjLst/>
-              </dgm:shape>
-              <dgm:presOf axis="self" ptType="node" cnt="1"/>
-              <dgm:constrLst>
-                <dgm:constr type="primFontSz" val="65"/>
-                <dgm:constr type="lMarg" refType="primFontSz" fact="0.05"/>
-                <dgm:constr type="rMarg" refType="primFontSz" fact="0.05"/>
-                <dgm:constr type="tMarg" refType="primFontSz" fact="0.05"/>
-                <dgm:constr type="bMarg" refType="primFontSz" fact="0.05"/>
-              </dgm:constrLst>
-              <dgm:ruleLst>
-                <dgm:rule type="primFontSz" val="5" fact="NaN" max="NaN"/>
-              </dgm:ruleLst>
-            </dgm:layoutNode>
-            <dgm:layoutNode name="rootConnector1" moveWith="rootText1">
-              <dgm:alg type="sp"/>
-              <dgm:shape xmlns:r="http://schemas.openxmlformats.org/officeDocument/2006/relationships" type="rect" r:blip="" hideGeom="1">
-                <dgm:adjLst/>
-              </dgm:shape>
-              <dgm:presOf axis="self" ptType="node" cnt="1"/>
-              <dgm:constrLst/>
-              <dgm:ruleLst/>
-            </dgm:layoutNode>
+            <dgm:presOf axis="des" ptType="node"/>
+            <dgm:constrLst>
+              <dgm:constr type="tMarg" refType="primFontSz" fact="0.1"/>
+              <dgm:constr type="bMarg" refType="primFontSz" fact="0.1"/>
+              <dgm:constr type="lMarg" refType="w" fact="0.09"/>
+            </dgm:constrLst>
+            <dgm:ruleLst>
+              <dgm:rule type="h" val="INF" fact="NaN" max="NaN"/>
+            </dgm:ruleLst>
           </dgm:layoutNode>
-          <dgm:layoutNode name="hierChild2">
-            <dgm:choose name="Name21">
-              <dgm:if name="Name22" func="var" arg="hierBranch" op="equ" val="l">
-                <dgm:alg type="hierChild">
-                  <dgm:param type="chAlign" val="r"/>
-                  <dgm:param type="linDir" val="fromT"/>
-                </dgm:alg>
-              </dgm:if>
-              <dgm:if name="Name23" func="var" arg="hierBranch" op="equ" val="r">
-                <dgm:alg type="hierChild">
-                  <dgm:param type="chAlign" val="l"/>
-                  <dgm:param type="linDir" val="fromT"/>
-                </dgm:alg>
-              </dgm:if>
-              <dgm:if name="Name24" func="var" arg="hierBranch" op="equ" val="hang">
-                <dgm:choose name="Name25">
-                  <dgm:if name="Name26" func="var" arg="dir" op="equ" val="norm">
-                    <dgm:alg type="hierChild">
-                      <dgm:param type="chAlign" val="l"/>
-                      <dgm:param type="linDir" val="fromL"/>
-                      <dgm:param type="secChAlign" val="t"/>
-                      <dgm:param type="secLinDir" val="fromT"/>
-                    </dgm:alg>
-                  </dgm:if>
-                  <dgm:else name="Name27">
-                    <dgm:alg type="hierChild">
-                      <dgm:param type="chAlign" val="l"/>
-                      <dgm:param type="linDir" val="fromR"/>
-                      <dgm:param type="secChAlign" val="t"/>
-                      <dgm:param type="secLinDir" val="fromT"/>
-                    </dgm:alg>
-                  </dgm:else>
-                </dgm:choose>
-              </dgm:if>
-              <dgm:else name="Name28">
-                <dgm:choose name="Name29">
-                  <dgm:if name="Name30" func="var" arg="dir" op="equ" val="norm">
-                    <dgm:alg type="hierChild"/>
-                  </dgm:if>
-                  <dgm:else name="Name31">
-                    <dgm:alg type="hierChild">
-                      <dgm:param type="linDir" val="fromR"/>
-                    </dgm:alg>
-                  </dgm:else>
-                </dgm:choose>
-              </dgm:else>
-            </dgm:choose>
-            <dgm:shape xmlns:r="http://schemas.openxmlformats.org/officeDocument/2006/relationships" r:blip="">
-              <dgm:adjLst/>
-            </dgm:shape>
-            <dgm:presOf/>
-            <dgm:constrLst/>
-            <dgm:ruleLst/>
-            <dgm:forEach name="rep2a" axis="ch" ptType="nonAsst">
-              <dgm:forEach name="Name32" axis="precedSib" ptType="parTrans" st="-1" cnt="1">
-                <dgm:choose name="Name33">
-                  <dgm:if name="Name34" func="var" arg="hierBranch" op="equ" val="std">
-                    <dgm:layoutNode name="Name35">
-                      <dgm:alg type="conn">
-                        <dgm:param type="connRout" val="bend"/>
-                        <dgm:param type="dim" val="1D"/>
-                        <dgm:param type="endSty" val="noArr"/>
-                        <dgm:param type="begPts" val="bCtr"/>
-                        <dgm:param type="endPts" val="tCtr"/>
-                        <dgm:param type="bendPt" val="end"/>
-                      </dgm:alg>
-                      <dgm:shape xmlns:r="http://schemas.openxmlformats.org/officeDocument/2006/relationships" type="conn" r:blip="" zOrderOff="-99999">
-                        <dgm:adjLst/>
-                      </dgm:shape>
-                      <dgm:presOf axis="self"/>
-                      <dgm:constrLst>
-                        <dgm:constr type="begPad"/>
-                        <dgm:constr type="endPad"/>
-                      </dgm:constrLst>
-                      <dgm:ruleLst/>
-                    </dgm:layoutNode>
-                  </dgm:if>
-                  <dgm:if name="Name36" func="var" arg="hierBranch" op="equ" val="init">
-                    <dgm:layoutNode name="Name37">
-                      <dgm:choose name="Name38">
-                        <dgm:if name="Name39" axis="self" func="depth" op="lte" val="2">
-                          <dgm:alg type="conn">
-                            <dgm:param type="connRout" val="bend"/>
-                            <dgm:param type="dim" val="1D"/>
-                            <dgm:param type="endSty" val="noArr"/>
-                            <dgm:param type="begPts" val="bCtr"/>
-                            <dgm:param type="endPts" val="tCtr"/>
-                            <dgm:param type="bendPt" val="end"/>
-                          </dgm:alg>
-                        </dgm:if>
-                        <dgm:else name="Name40">
-                          <dgm:choose name="Name41">
-                            <dgm:if name="Name42" axis="par des" func="maxDepth" op="lte" val="1">
-                              <dgm:choose name="Name43">
-                                <dgm:if name="Name44" axis="par ch" ptType="node asst" func="cnt" op="gte" val="1">
-                                  <dgm:alg type="conn">
-                                    <dgm:param type="connRout" val="bend"/>
-                                    <dgm:param type="dim" val="1D"/>
-                                    <dgm:param type="endSty" val="noArr"/>
-                                    <dgm:param type="begPts" val="bCtr"/>
-                                    <dgm:param type="endPts" val="midL midR"/>
-                                  </dgm:alg>
-                                </dgm:if>
-                                <dgm:else name="Name45">
-                                  <dgm:alg type="conn">
-                                    <dgm:param type="connRout" val="bend"/>
-                                    <dgm:param type="dim" val="1D"/>
-                                    <dgm:param type="endSty" val="noArr"/>
-                                    <dgm:param type="begPts" val="bCtr"/>
-                                    <dgm:param type="endPts" val="midL midR"/>
-                                    <dgm:param type="srcNode" val="rootConnector"/>
-                                  </dgm:alg>
-                                </dgm:else>
-                              </dgm:choose>
-                            </dgm:if>
-                            <dgm:else name="Name46">
-                              <dgm:alg type="conn">
-                                <dgm:param type="connRout" val="bend"/>
-                                <dgm:param type="dim" val="1D"/>
-                                <dgm:param type="endSty" val="noArr"/>
-                                <dgm:param type="begPts" val="bCtr"/>
-                                <dgm:param type="endPts" val="tCtr"/>
-                                <dgm:param type="bendPt" val="end"/>
-                              </dgm:alg>
-                            </dgm:else>
-                          </dgm:choose>
-                        </dgm:else>
-                      </dgm:choose>
-                      <dgm:shape xmlns:r="http://schemas.openxmlformats.org/officeDocument/2006/relationships" type="conn" r:blip="" zOrderOff="-99999">
-                        <dgm:adjLst/>
-                      </dgm:shape>
-                      <dgm:presOf axis="self"/>
-                      <dgm:constrLst>
-                        <dgm:constr type="begPad"/>
-                        <dgm:constr type="endPad"/>
-                      </dgm:constrLst>
-                      <dgm:ruleLst/>
-                    </dgm:layoutNode>
-                  </dgm:if>
-                  <dgm:if name="Name47" func="var" arg="hierBranch" op="equ" val="hang">
-                    <dgm:layoutNode name="Name48">
-                      <dgm:alg type="conn">
-                        <dgm:param type="connRout" val="bend"/>
-                        <dgm:param type="dim" val="1D"/>
-                        <dgm:param type="endSty" val="noArr"/>
-                        <dgm:param type="begPts" val="bCtr"/>
-                        <dgm:param type="endPts" val="midL midR"/>
-                      </dgm:alg>
-                      <dgm:shape xmlns:r="http://schemas.openxmlformats.org/officeDocument/2006/relationships" type="conn" r:blip="" zOrderOff="-99999">
-                        <dgm:adjLst/>
-                      </dgm:shape>
-                      <dgm:presOf axis="self"/>
-                      <dgm:constrLst>
-                        <dgm:constr type="begPad"/>
-                        <dgm:constr type="endPad"/>
-                      </dgm:constrLst>
-                      <dgm:ruleLst/>
-                    </dgm:layoutNode>
-                  </dgm:if>
-                  <dgm:else name="Name49">
-                    <dgm:layoutNode name="Name50">
-                      <dgm:choose name="Name51">
-                        <dgm:if name="Name52" axis="self" func="depth" op="lte" val="2">
-                          <dgm:choose name="Name53">
-                            <dgm:if name="Name54" axis="par ch" ptType="node asst" func="cnt" op="gte" val="1">
-                              <dgm:alg type="conn">
-                                <dgm:param type="connRout" val="bend"/>
-                                <dgm:param type="dim" val="1D"/>
-                                <dgm:param type="endSty" val="noArr"/>
-                                <dgm:param type="begPts" val="bCtr"/>
-                                <dgm:param type="endPts" val="midL midR"/>
-                              </dgm:alg>
-                            </dgm:if>
-                            <dgm:else name="Name55">
-                              <dgm:alg type="conn">
-                                <dgm:param type="connRout" val="bend"/>
-                                <dgm:param type="dim" val="1D"/>
-                                <dgm:param type="endSty" val="noArr"/>
-                                <dgm:param type="begPts" val="bCtr"/>
-                                <dgm:param type="endPts" val="midL midR"/>
-                                <dgm:param type="srcNode" val="rootConnector1"/>
-                              </dgm:alg>
-                            </dgm:else>
-                          </dgm:choose>
-                        </dgm:if>
-                        <dgm:else name="Name56">
-                          <dgm:choose name="Name57">
-                            <dgm:if name="Name58" axis="par ch" ptType="node asst" func="cnt" op="gte" val="1">
-                              <dgm:alg type="conn">
-                                <dgm:param type="connRout" val="bend"/>
-                                <dgm:param type="dim" val="1D"/>
-                                <dgm:param type="endSty" val="noArr"/>
-                                <dgm:param type="begPts" val="bCtr"/>
-                                <dgm:param type="endPts" val="midL midR"/>
-                              </dgm:alg>
-                            </dgm:if>
-                            <dgm:else name="Name59">
-                              <dgm:alg type="conn">
-                                <dgm:param type="connRout" val="bend"/>
-                                <dgm:param type="dim" val="1D"/>
-                                <dgm:param type="endSty" val="noArr"/>
-                                <dgm:param type="begPts" val="bCtr"/>
-                                <dgm:param type="endPts" val="midL midR"/>
-                                <dgm:param type="srcNode" val="rootConnector"/>
-                              </dgm:alg>
-                            </dgm:else>
-                          </dgm:choose>
-                        </dgm:else>
-                      </dgm:choose>
-                      <dgm:shape xmlns:r="http://schemas.openxmlformats.org/officeDocument/2006/relationships" type="conn" r:blip="" zOrderOff="-99999">
-                        <dgm:adjLst/>
-                      </dgm:shape>
-                      <dgm:presOf axis="self"/>
-                      <dgm:constrLst>
-                        <dgm:constr type="begPad"/>
-                        <dgm:constr type="endPad"/>
-                      </dgm:constrLst>
-                      <dgm:ruleLst/>
-                    </dgm:layoutNode>
-                  </dgm:else>
-                </dgm:choose>
-              </dgm:forEach>
-              <dgm:layoutNode name="hierRoot2">
-                <dgm:varLst>
-                  <dgm:hierBranch val="init"/>
-                </dgm:varLst>
-                <dgm:choose name="Name60">
-                  <dgm:if name="Name61" func="var" arg="hierBranch" op="equ" val="l">
-                    <dgm:choose name="Name62">
-                      <dgm:if name="Name63" axis="ch" ptType="asst" func="cnt" op="gte" val="1">
-                        <dgm:alg type="hierRoot">
-                          <dgm:param type="hierAlign" val="tR"/>
-                        </dgm:alg>
-                        <dgm:shape xmlns:r="http://schemas.openxmlformats.org/officeDocument/2006/relationships" r:blip="">
-                          <dgm:adjLst/>
-                        </dgm:shape>
-                        <dgm:presOf/>
-                        <dgm:constrLst>
-                          <dgm:constr type="alignOff" val="0.65"/>
-                        </dgm:constrLst>
-                      </dgm:if>
-                      <dgm:else name="Name64">
-                        <dgm:alg type="hierRoot">
-                          <dgm:param type="hierAlign" val="tR"/>
-                        </dgm:alg>
-                        <dgm:shape xmlns:r="http://schemas.openxmlformats.org/officeDocument/2006/relationships" r:blip="">
-                          <dgm:adjLst/>
-                        </dgm:shape>
-                        <dgm:presOf/>
-                        <dgm:constrLst>
-                          <dgm:constr type="alignOff" val="0.25"/>
-                        </dgm:constrLst>
-                      </dgm:else>
-                    </dgm:choose>
-                  </dgm:if>
-                  <dgm:if name="Name65" func="var" arg="hierBranch" op="equ" val="r">
-                    <dgm:choose name="Name66">
-                      <dgm:if name="Name67" axis="ch" ptType="asst" func="cnt" op="gte" val="1">
-                        <dgm:alg type="hierRoot">
-                          <dgm:param type="hierAlign" val="tL"/>
-                        </dgm:alg>
-                        <dgm:shape xmlns:r="http://schemas.openxmlformats.org/officeDocument/2006/relationships" r:blip="">
-                          <dgm:adjLst/>
-                        </dgm:shape>
-                        <dgm:presOf/>
-                        <dgm:constrLst>
-                          <dgm:constr type="alignOff" val="0.65"/>
-                        </dgm:constrLst>
-                      </dgm:if>
-                      <dgm:else name="Name68">
-                        <dgm:alg type="hierRoot">
-                          <dgm:param type="hierAlign" val="tL"/>
-                        </dgm:alg>
-                        <dgm:shape xmlns:r="http://schemas.openxmlformats.org/officeDocument/2006/relationships" r:blip="">
-                          <dgm:adjLst/>
-                        </dgm:shape>
-                        <dgm:presOf/>
-                        <dgm:constrLst>
-                          <dgm:constr type="alignOff" val="0.25"/>
-                        </dgm:constrLst>
-                      </dgm:else>
-                    </dgm:choose>
-                  </dgm:if>
-                  <dgm:if name="Name69" func="var" arg="hierBranch" op="equ" val="std">
-                    <dgm:alg type="hierRoot"/>
-                    <dgm:shape xmlns:r="http://schemas.openxmlformats.org/officeDocument/2006/relationships" r:blip="">
-                      <dgm:adjLst/>
-                    </dgm:shape>
-                    <dgm:presOf/>
-                    <dgm:constrLst>
-                      <dgm:constr type="alignOff"/>
-                      <dgm:constr type="bendDist" for="des" ptType="parTrans" refType="sp" fact="0.5"/>
-                    </dgm:constrLst>
-                  </dgm:if>
-                  <dgm:if name="Name70" func="var" arg="hierBranch" op="equ" val="init">
-                    <dgm:choose name="Name71">
-                      <dgm:if name="Name72" axis="des" func="maxDepth" op="lte" val="1">
-                        <dgm:choose name="Name73">
-                          <dgm:if name="Name74" axis="ch" ptType="asst" func="cnt" op="gte" val="1">
-                            <dgm:alg type="hierRoot">
-                              <dgm:param type="hierAlign" val="tL"/>
-                            </dgm:alg>
-                            <dgm:shape xmlns:r="http://schemas.openxmlformats.org/officeDocument/2006/relationships" r:blip="">
-                              <dgm:adjLst/>
-                            </dgm:shape>
-                            <dgm:presOf/>
-                            <dgm:constrLst>
-                              <dgm:constr type="alignOff" val="0.65"/>
-                            </dgm:constrLst>
-                          </dgm:if>
-                          <dgm:else name="Name75">
-                            <dgm:alg type="hierRoot">
-                              <dgm:param type="hierAlign" val="tL"/>
-                            </dgm:alg>
-                            <dgm:shape xmlns:r="http://schemas.openxmlformats.org/officeDocument/2006/relationships" r:blip="">
-                              <dgm:adjLst/>
-                            </dgm:shape>
-                            <dgm:presOf/>
-                            <dgm:constrLst>
-                              <dgm:constr type="alignOff" val="0.25"/>
-                            </dgm:constrLst>
-                          </dgm:else>
-                        </dgm:choose>
-                      </dgm:if>
-                      <dgm:else name="Name76">
-                        <dgm:alg type="hierRoot"/>
-                        <dgm:shape xmlns:r="http://schemas.openxmlformats.org/officeDocument/2006/relationships" r:blip="">
-                          <dgm:adjLst/>
-                        </dgm:shape>
-                        <dgm:presOf/>
-                        <dgm:constrLst>
-                          <dgm:constr type="alignOff"/>
-                          <dgm:constr type="bendDist" for="des" ptType="parTrans" refType="sp" fact="0.5"/>
-                        </dgm:constrLst>
-                      </dgm:else>
-                    </dgm:choose>
-                  </dgm:if>
-                  <dgm:else name="Name77">
-                    <dgm:alg type="hierRoot"/>
-                    <dgm:shape xmlns:r="http://schemas.openxmlformats.org/officeDocument/2006/relationships" r:blip="">
-                      <dgm:adjLst/>
-                    </dgm:shape>
-                    <dgm:presOf/>
-                    <dgm:constrLst>
-                      <dgm:constr type="alignOff" val="0.65"/>
-                    </dgm:constrLst>
-                  </dgm:else>
-                </dgm:choose>
-                <dgm:ruleLst/>
-                <dgm:layoutNode name="rootComposite">
-                  <dgm:alg type="composite"/>
-                  <dgm:shape xmlns:r="http://schemas.openxmlformats.org/officeDocument/2006/relationships" r:blip="">
-                    <dgm:adjLst/>
-                  </dgm:shape>
-                  <dgm:presOf axis="self" ptType="node" cnt="1"/>
-                  <dgm:choose name="Name78">
-                    <dgm:if name="Name79" func="var" arg="hierBranch" op="equ" val="init">
-                      <dgm:constrLst>
-                        <dgm:constr type="l" for="ch" forName="rootText"/>
-                        <dgm:constr type="t" for="ch" forName="rootText"/>
-                        <dgm:constr type="w" for="ch" forName="rootText" refType="w"/>
-                        <dgm:constr type="h" for="ch" forName="rootText" refType="h"/>
-                        <dgm:constr type="l" for="ch" forName="rootConnector"/>
-                        <dgm:constr type="t" for="ch" forName="rootConnector"/>
-                        <dgm:constr type="w" for="ch" forName="rootConnector" refType="w" refFor="ch" refForName="rootText" fact="0.2"/>
-                        <dgm:constr type="h" for="ch" forName="rootConnector" refType="h" refFor="ch" refForName="rootText"/>
-                      </dgm:constrLst>
-                    </dgm:if>
-                    <dgm:if name="Name80" func="var" arg="hierBranch" op="equ" val="l">
-                      <dgm:constrLst>
-                        <dgm:constr type="l" for="ch" forName="rootText"/>
-                        <dgm:constr type="t" for="ch" forName="rootText"/>
-                        <dgm:constr type="w" for="ch" forName="rootText" refType="w"/>
-                        <dgm:constr type="h" for="ch" forName="rootText" refType="h"/>
-                        <dgm:constr type="r" for="ch" forName="rootConnector" refType="w"/>
-                        <dgm:constr type="t" for="ch" forName="rootConnector"/>
-                        <dgm:constr type="w" for="ch" forName="rootConnector" refType="w" refFor="ch" refForName="rootText" fact="0.2"/>
-                        <dgm:constr type="h" for="ch" forName="rootConnector" refType="h" refFor="ch" refForName="rootText"/>
-                      </dgm:constrLst>
-                    </dgm:if>
-                    <dgm:if name="Name81" func="var" arg="hierBranch" op="equ" val="r">
-                      <dgm:constrLst>
-                        <dgm:constr type="l" for="ch" forName="rootText"/>
-                        <dgm:constr type="t" for="ch" forName="rootText"/>
-                        <dgm:constr type="w" for="ch" forName="rootText" refType="w"/>
-                        <dgm:constr type="h" for="ch" forName="rootText" refType="h"/>
-                        <dgm:constr type="l" for="ch" forName="rootConnector"/>
-                        <dgm:constr type="t" for="ch" forName="rootConnector"/>
-                        <dgm:constr type="w" for="ch" forName="rootConnector" refType="w" refFor="ch" refForName="rootText" fact="0.2"/>
-                        <dgm:constr type="h" for="ch" forName="rootConnector" refType="h" refFor="ch" refForName="rootText"/>
-                      </dgm:constrLst>
-                    </dgm:if>
-                    <dgm:else name="Name82">
-                      <dgm:constrLst>
-                        <dgm:constr type="l" for="ch" forName="rootText"/>
-                        <dgm:constr type="t" for="ch" forName="rootText"/>
-                        <dgm:constr type="w" for="ch" forName="rootText" refType="w"/>
-                        <dgm:constr type="h" for="ch" forName="rootText" refType="h"/>
-                        <dgm:constr type="r" for="ch" forName="rootConnector" refType="w"/>
-                        <dgm:constr type="t" for="ch" forName="rootConnector"/>
-                        <dgm:constr type="w" for="ch" forName="rootConnector" refType="w" refFor="ch" refForName="rootText" fact="0.2"/>
-                        <dgm:constr type="h" for="ch" forName="rootConnector" refType="h" refFor="ch" refForName="rootText"/>
-                      </dgm:constrLst>
-                    </dgm:else>
-                  </dgm:choose>
-                  <dgm:ruleLst/>
-                  <dgm:layoutNode name="rootText">
-                    <dgm:varLst>
-                      <dgm:chPref val="3"/>
-                    </dgm:varLst>
-                    <dgm:alg type="tx"/>
-                    <dgm:shape xmlns:r="http://schemas.openxmlformats.org/officeDocument/2006/relationships" type="rect" r:blip="">
-                      <dgm:adjLst/>
-                    </dgm:shape>
-                    <dgm:presOf axis="self" ptType="node" cnt="1"/>
-                    <dgm:constrLst>
-                      <dgm:constr type="primFontSz" val="65"/>
-                      <dgm:constr type="lMarg" refType="primFontSz" fact="0.05"/>
-                      <dgm:constr type="rMarg" refType="primFontSz" fact="0.05"/>
-                      <dgm:constr type="tMarg" refType="primFontSz" fact="0.05"/>
-                      <dgm:constr type="bMarg" refType="primFontSz" fact="0.05"/>
-                    </dgm:constrLst>
-                    <dgm:ruleLst>
-                      <dgm:rule type="primFontSz" val="5" fact="NaN" max="NaN"/>
-                    </dgm:ruleLst>
-                  </dgm:layoutNode>
-                  <dgm:layoutNode name="rootConnector" moveWith="rootText">
-                    <dgm:alg type="sp"/>
-                    <dgm:shape xmlns:r="http://schemas.openxmlformats.org/officeDocument/2006/relationships" type="rect" r:blip="" hideGeom="1">
-                      <dgm:adjLst/>
-                    </dgm:shape>
-                    <dgm:presOf axis="self" ptType="node" cnt="1"/>
-                    <dgm:constrLst/>
-                    <dgm:ruleLst/>
-                  </dgm:layoutNode>
-                </dgm:layoutNode>
-                <dgm:layoutNode name="hierChild4">
-                  <dgm:choose name="Name83">
-                    <dgm:if name="Name84" func="var" arg="hierBranch" op="equ" val="l">
-                      <dgm:alg type="hierChild">
-                        <dgm:param type="chAlign" val="r"/>
-                        <dgm:param type="linDir" val="fromT"/>
-                      </dgm:alg>
-                    </dgm:if>
-                    <dgm:if name="Name85" func="var" arg="hierBranch" op="equ" val="r">
-                      <dgm:alg type="hierChild">
-                        <dgm:param type="chAlign" val="l"/>
-                        <dgm:param type="linDir" val="fromT"/>
-                      </dgm:alg>
-                    </dgm:if>
-                    <dgm:if name="Name86" func="var" arg="hierBranch" op="equ" val="hang">
-                      <dgm:choose name="Name87">
-                        <dgm:if name="Name88" func="var" arg="dir" op="equ" val="norm">
-                          <dgm:alg type="hierChild">
-                            <dgm:param type="chAlign" val="l"/>
-                            <dgm:param type="linDir" val="fromL"/>
-                            <dgm:param type="secChAlign" val="t"/>
-                            <dgm:param type="secLinDir" val="fromT"/>
-                          </dgm:alg>
-                        </dgm:if>
-                        <dgm:else name="Name89">
-                          <dgm:alg type="hierChild">
-                            <dgm:param type="chAlign" val="l"/>
-                            <dgm:param type="linDir" val="fromR"/>
-                            <dgm:param type="secChAlign" val="t"/>
-                            <dgm:param type="secLinDir" val="fromT"/>
-                          </dgm:alg>
-                        </dgm:else>
-                      </dgm:choose>
-                    </dgm:if>
-                    <dgm:if name="Name90" func="var" arg="hierBranch" op="equ" val="std">
-                      <dgm:choose name="Name91">
-                        <dgm:if name="Name92" func="var" arg="dir" op="equ" val="norm">
-                          <dgm:alg type="hierChild"/>
-                        </dgm:if>
-                        <dgm:else name="Name93">
-                          <dgm:alg type="hierChild">
-                            <dgm:param type="linDir" val="fromR"/>
-                          </dgm:alg>
-                        </dgm:else>
-                      </dgm:choose>
-                    </dgm:if>
-                    <dgm:if name="Name94" func="var" arg="hierBranch" op="equ" val="init">
-                      <dgm:choose name="Name95">
-                        <dgm:if name="Name96" axis="des" func="maxDepth" op="lte" val="1">
-                          <dgm:alg type="hierChild">
-                            <dgm:param type="chAlign" val="l"/>
-                            <dgm:param type="linDir" val="fromT"/>
-                          </dgm:alg>
-                        </dgm:if>
-                        <dgm:else name="Name97">
-                          <dgm:choose name="Name98">
-                            <dgm:if name="Name99" func="var" arg="dir" op="equ" val="norm">
-                              <dgm:alg type="hierChild"/>
-                            </dgm:if>
-                            <dgm:else name="Name100">
-                              <dgm:alg type="hierChild">
-                                <dgm:param type="linDir" val="fromR"/>
-                              </dgm:alg>
-                            </dgm:else>
-                          </dgm:choose>
-                        </dgm:else>
-                      </dgm:choose>
-                    </dgm:if>
-                    <dgm:else name="Name101"/>
-                  </dgm:choose>
+        </dgm:if>
+        <dgm:else name="Name3">
+          <dgm:choose name="Name4">
+            <dgm:if name="Name5" axis="par ch" ptType="doc node" func="cnt" op="gte" val="2">
+              <dgm:forEach name="Name6" axis="followSib" ptType="sibTrans" cnt="1">
+                <dgm:layoutNode name="spacer">
+                  <dgm:alg type="sp"/>
                   <dgm:shape xmlns:r="http://schemas.openxmlformats.org/officeDocument/2006/relationships" r:blip="">
                     <dgm:adjLst/>
                   </dgm:shape>
                   <dgm:presOf/>
                   <dgm:constrLst/>
                   <dgm:ruleLst/>
-                  <dgm:forEach name="Name102" ref="rep2a"/>
-                </dgm:layoutNode>
-                <dgm:layoutNode name="hierChild5">
-                  <dgm:choose name="Name103">
-                    <dgm:if name="Name104" func="var" arg="dir" op="equ" val="norm">
-                      <dgm:alg type="hierChild">
-                        <dgm:param type="chAlign" val="l"/>
-                        <dgm:param type="linDir" val="fromL"/>
-                        <dgm:param type="secChAlign" val="t"/>
-                        <dgm:param type="secLinDir" val="fromT"/>
-                      </dgm:alg>
-                    </dgm:if>
-                    <dgm:else name="Name105">
-                      <dgm:alg type="hierChild">
-                        <dgm:param type="chAlign" val="l"/>
-                        <dgm:param type="linDir" val="fromR"/>
-                        <dgm:param type="secChAlign" val="t"/>
-                        <dgm:param type="secLinDir" val="fromT"/>
-                      </dgm:alg>
-                    </dgm:else>
-                  </dgm:choose>
-                  <dgm:shape xmlns:r="http://schemas.openxmlformats.org/officeDocument/2006/relationships" r:blip="">
-                    <dgm:adjLst/>
-                  </dgm:shape>
-                  <dgm:presOf/>
-                  <dgm:constrLst/>
-                  <dgm:ruleLst/>
-                  <dgm:forEach name="Name106" ref="rep2b"/>
-                </dgm:layoutNode>
-              </dgm:layoutNode>
-            </dgm:forEach>
-          </dgm:layoutNode>
-          <dgm:layoutNode name="hierChild3">
-            <dgm:choose name="Name107">
-              <dgm:if name="Name108" func="var" arg="dir" op="equ" val="norm">
-                <dgm:alg type="hierChild">
-                  <dgm:param type="chAlign" val="l"/>
-                  <dgm:param type="linDir" val="fromL"/>
-                  <dgm:param type="secChAlign" val="t"/>
-                  <dgm:param type="secLinDir" val="fromT"/>
-                </dgm:alg>
-              </dgm:if>
-              <dgm:else name="Name109">
-                <dgm:alg type="hierChild">
-                  <dgm:param type="chAlign" val="l"/>
-                  <dgm:param type="linDir" val="fromR"/>
-                  <dgm:param type="secChAlign" val="t"/>
-                  <dgm:param type="secLinDir" val="fromT"/>
-                </dgm:alg>
-              </dgm:else>
-            </dgm:choose>
-            <dgm:shape xmlns:r="http://schemas.openxmlformats.org/officeDocument/2006/relationships" r:blip="">
-              <dgm:adjLst/>
-            </dgm:shape>
-            <dgm:presOf/>
-            <dgm:constrLst/>
-            <dgm:ruleLst/>
-            <dgm:forEach name="rep2b" axis="ch" ptType="asst">
-              <dgm:forEach name="Name110" axis="precedSib" ptType="parTrans" st="-1" cnt="1">
-                <dgm:layoutNode name="Name111">
-                  <dgm:alg type="conn">
-                    <dgm:param type="connRout" val="bend"/>
-                    <dgm:param type="dim" val="1D"/>
-                    <dgm:param type="endSty" val="noArr"/>
-                    <dgm:param type="begPts" val="bCtr"/>
-                    <dgm:param type="endPts" val="midL midR"/>
-                  </dgm:alg>
-                  <dgm:shape xmlns:r="http://schemas.openxmlformats.org/officeDocument/2006/relationships" type="conn" r:blip="" zOrderOff="-99999">
-                    <dgm:adjLst/>
-                  </dgm:shape>
-                  <dgm:presOf axis="self"/>
-                  <dgm:constrLst>
-                    <dgm:constr type="begPad"/>
-                    <dgm:constr type="endPad"/>
-                  </dgm:constrLst>
-                  <dgm:ruleLst/>
                 </dgm:layoutNode>
               </dgm:forEach>
-              <dgm:layoutNode name="hierRoot3">
-                <dgm:varLst>
-                  <dgm:hierBranch val="init"/>
-                </dgm:varLst>
-                <dgm:choose name="Name112">
-                  <dgm:if name="Name113" func="var" arg="hierBranch" op="equ" val="l">
-                    <dgm:alg type="hierRoot">
-                      <dgm:param type="hierAlign" val="tR"/>
-                    </dgm:alg>
-                    <dgm:shape xmlns:r="http://schemas.openxmlformats.org/officeDocument/2006/relationships" r:blip="">
-                      <dgm:adjLst/>
-                    </dgm:shape>
-                    <dgm:presOf/>
-                    <dgm:constrLst>
-                      <dgm:constr type="alignOff" val="0.65"/>
-                    </dgm:constrLst>
-                  </dgm:if>
-                  <dgm:if name="Name114" func="var" arg="hierBranch" op="equ" val="r">
-                    <dgm:alg type="hierRoot">
-                      <dgm:param type="hierAlign" val="tL"/>
-                    </dgm:alg>
-                    <dgm:shape xmlns:r="http://schemas.openxmlformats.org/officeDocument/2006/relationships" r:blip="">
-                      <dgm:adjLst/>
-                    </dgm:shape>
-                    <dgm:presOf/>
-                    <dgm:constrLst>
-                      <dgm:constr type="alignOff" val="0.65"/>
-                    </dgm:constrLst>
-                  </dgm:if>
-                  <dgm:if name="Name115" func="var" arg="hierBranch" op="equ" val="hang">
-                    <dgm:alg type="hierRoot"/>
-                    <dgm:shape xmlns:r="http://schemas.openxmlformats.org/officeDocument/2006/relationships" r:blip="">
-                      <dgm:adjLst/>
-                    </dgm:shape>
-                    <dgm:presOf/>
-                    <dgm:constrLst>
-                      <dgm:constr type="alignOff" val="0.65"/>
-                    </dgm:constrLst>
-                  </dgm:if>
-                  <dgm:if name="Name116" func="var" arg="hierBranch" op="equ" val="std">
-                    <dgm:alg type="hierRoot"/>
-                    <dgm:shape xmlns:r="http://schemas.openxmlformats.org/officeDocument/2006/relationships" r:blip="">
-                      <dgm:adjLst/>
-                    </dgm:shape>
-                    <dgm:presOf/>
-                    <dgm:constrLst>
-                      <dgm:constr type="alignOff"/>
-                      <dgm:constr type="bendDist" for="des" ptType="parTrans" refType="sp" fact="0.5"/>
-                    </dgm:constrLst>
-                  </dgm:if>
-                  <dgm:if name="Name117" func="var" arg="hierBranch" op="equ" val="init">
-                    <dgm:choose name="Name118">
-                      <dgm:if name="Name119" axis="des" func="maxDepth" op="lte" val="1">
-                        <dgm:alg type="hierRoot">
-                          <dgm:param type="hierAlign" val="tL"/>
-                        </dgm:alg>
-                        <dgm:shape xmlns:r="http://schemas.openxmlformats.org/officeDocument/2006/relationships" r:blip="">
-                          <dgm:adjLst/>
-                        </dgm:shape>
-                        <dgm:presOf/>
-                        <dgm:constrLst>
-                          <dgm:constr type="alignOff" val="0.65"/>
-                        </dgm:constrLst>
-                      </dgm:if>
-                      <dgm:else name="Name120">
-                        <dgm:alg type="hierRoot"/>
-                        <dgm:shape xmlns:r="http://schemas.openxmlformats.org/officeDocument/2006/relationships" r:blip="">
-                          <dgm:adjLst/>
-                        </dgm:shape>
-                        <dgm:presOf/>
-                        <dgm:constrLst>
-                          <dgm:constr type="alignOff"/>
-                          <dgm:constr type="bendDist" for="des" ptType="parTrans" refType="sp" fact="0.5"/>
-                        </dgm:constrLst>
-                      </dgm:else>
-                    </dgm:choose>
-                  </dgm:if>
-                  <dgm:else name="Name121"/>
-                </dgm:choose>
-                <dgm:ruleLst/>
-                <dgm:layoutNode name="rootComposite3">
-                  <dgm:alg type="composite"/>
-                  <dgm:shape xmlns:r="http://schemas.openxmlformats.org/officeDocument/2006/relationships" r:blip="">
-                    <dgm:adjLst/>
-                  </dgm:shape>
-                  <dgm:presOf axis="self" ptType="node" cnt="1"/>
-                  <dgm:choose name="Name122">
-                    <dgm:if name="Name123" func="var" arg="hierBranch" op="equ" val="init">
-                      <dgm:constrLst>
-                        <dgm:constr type="l" for="ch" forName="rootText3"/>
-                        <dgm:constr type="t" for="ch" forName="rootText3"/>
-                        <dgm:constr type="w" for="ch" forName="rootText3" refType="w"/>
-                        <dgm:constr type="h" for="ch" forName="rootText3" refType="h"/>
-                        <dgm:constr type="l" for="ch" forName="rootConnector3"/>
-                        <dgm:constr type="t" for="ch" forName="rootConnector3"/>
-                        <dgm:constr type="w" for="ch" forName="rootConnector3" refType="w" refFor="ch" refForName="rootText3" fact="0.2"/>
-                        <dgm:constr type="h" for="ch" forName="rootConnector3" refType="h" refFor="ch" refForName="rootText3"/>
-                      </dgm:constrLst>
-                    </dgm:if>
-                    <dgm:if name="Name124" func="var" arg="hierBranch" op="equ" val="l">
-                      <dgm:constrLst>
-                        <dgm:constr type="l" for="ch" forName="rootText3"/>
-                        <dgm:constr type="t" for="ch" forName="rootText3"/>
-                        <dgm:constr type="w" for="ch" forName="rootText3" refType="w"/>
-                        <dgm:constr type="h" for="ch" forName="rootText3" refType="h"/>
-                        <dgm:constr type="r" for="ch" forName="rootConnector3" refType="w"/>
-                        <dgm:constr type="t" for="ch" forName="rootConnector3"/>
-                        <dgm:constr type="w" for="ch" forName="rootConnector3" refType="w" refFor="ch" refForName="rootText3" fact="0.2"/>
-                        <dgm:constr type="h" for="ch" forName="rootConnector3" refType="h" refFor="ch" refForName="rootText3"/>
-                      </dgm:constrLst>
-                    </dgm:if>
-                    <dgm:if name="Name125" func="var" arg="hierBranch" op="equ" val="r">
-                      <dgm:constrLst>
-                        <dgm:constr type="l" for="ch" forName="rootText3"/>
-                        <dgm:constr type="t" for="ch" forName="rootText3"/>
-                        <dgm:constr type="w" for="ch" forName="rootText3" refType="w"/>
-                        <dgm:constr type="h" for="ch" forName="rootText3" refType="h"/>
-                        <dgm:constr type="l" for="ch" forName="rootConnector3"/>
-                        <dgm:constr type="t" for="ch" forName="rootConnector3"/>
-                        <dgm:constr type="w" for="ch" forName="rootConnector3" refType="w" refFor="ch" refForName="rootText3" fact="0.2"/>
-                        <dgm:constr type="h" for="ch" forName="rootConnector3" refType="h" refFor="ch" refForName="rootText3"/>
-                      </dgm:constrLst>
-                    </dgm:if>
-                    <dgm:else name="Name126">
-                      <dgm:constrLst>
-                        <dgm:constr type="l" for="ch" forName="rootText3"/>
-                        <dgm:constr type="t" for="ch" forName="rootText3"/>
-                        <dgm:constr type="w" for="ch" forName="rootText3" refType="w"/>
-                        <dgm:constr type="h" for="ch" forName="rootText3" refType="h"/>
-                        <dgm:constr type="r" for="ch" forName="rootConnector3" refType="w"/>
-                        <dgm:constr type="t" for="ch" forName="rootConnector3"/>
-                        <dgm:constr type="w" for="ch" forName="rootConnector3" refType="w" refFor="ch" refForName="rootText3" fact="0.2"/>
-                        <dgm:constr type="h" for="ch" forName="rootConnector3" refType="h" refFor="ch" refForName="rootText3"/>
-                      </dgm:constrLst>
-                    </dgm:else>
-                  </dgm:choose>
-                  <dgm:ruleLst/>
-                  <dgm:layoutNode name="rootText3">
-                    <dgm:varLst>
-                      <dgm:chPref val="3"/>
-                    </dgm:varLst>
-                    <dgm:alg type="tx"/>
-                    <dgm:shape xmlns:r="http://schemas.openxmlformats.org/officeDocument/2006/relationships" type="rect" r:blip="">
-                      <dgm:adjLst/>
-                    </dgm:shape>
-                    <dgm:presOf axis="self" ptType="node" cnt="1"/>
-                    <dgm:constrLst>
-                      <dgm:constr type="primFontSz" val="65"/>
-                      <dgm:constr type="lMarg" refType="primFontSz" fact="0.05"/>
-                      <dgm:constr type="rMarg" refType="primFontSz" fact="0.05"/>
-                      <dgm:constr type="tMarg" refType="primFontSz" fact="0.05"/>
-                      <dgm:constr type="bMarg" refType="primFontSz" fact="0.05"/>
-                    </dgm:constrLst>
-                    <dgm:ruleLst>
-                      <dgm:rule type="primFontSz" val="5" fact="NaN" max="NaN"/>
-                    </dgm:ruleLst>
-                  </dgm:layoutNode>
-                  <dgm:layoutNode name="rootConnector3" moveWith="rootText1">
-                    <dgm:alg type="sp"/>
-                    <dgm:shape xmlns:r="http://schemas.openxmlformats.org/officeDocument/2006/relationships" type="rect" r:blip="" hideGeom="1">
-                      <dgm:adjLst/>
-                    </dgm:shape>
-                    <dgm:presOf axis="self" ptType="node" cnt="1"/>
-                    <dgm:constrLst/>
-                    <dgm:ruleLst/>
-                  </dgm:layoutNode>
-                </dgm:layoutNode>
-                <dgm:layoutNode name="hierChild6">
-                  <dgm:choose name="Name127">
-                    <dgm:if name="Name128" func="var" arg="hierBranch" op="equ" val="l">
-                      <dgm:alg type="hierChild">
-                        <dgm:param type="chAlign" val="r"/>
-                        <dgm:param type="linDir" val="fromT"/>
-                      </dgm:alg>
-                    </dgm:if>
-                    <dgm:if name="Name129" func="var" arg="hierBranch" op="equ" val="r">
-                      <dgm:alg type="hierChild">
-                        <dgm:param type="chAlign" val="l"/>
-                        <dgm:param type="linDir" val="fromT"/>
-                      </dgm:alg>
-                    </dgm:if>
-                    <dgm:if name="Name130" func="var" arg="hierBranch" op="equ" val="hang">
-                      <dgm:choose name="Name131">
-                        <dgm:if name="Name132" func="var" arg="dir" op="equ" val="norm">
-                          <dgm:alg type="hierChild">
-                            <dgm:param type="chAlign" val="l"/>
-                            <dgm:param type="linDir" val="fromL"/>
-                            <dgm:param type="secChAlign" val="t"/>
-                            <dgm:param type="secLinDir" val="fromT"/>
-                          </dgm:alg>
-                        </dgm:if>
-                        <dgm:else name="Name133">
-                          <dgm:alg type="hierChild">
-                            <dgm:param type="chAlign" val="l"/>
-                            <dgm:param type="linDir" val="fromR"/>
-                            <dgm:param type="secChAlign" val="t"/>
-                            <dgm:param type="secLinDir" val="fromT"/>
-                          </dgm:alg>
-                        </dgm:else>
-                      </dgm:choose>
-                    </dgm:if>
-                    <dgm:if name="Name134" func="var" arg="hierBranch" op="equ" val="std">
-                      <dgm:choose name="Name135">
-                        <dgm:if name="Name136" func="var" arg="dir" op="equ" val="norm">
-                          <dgm:alg type="hierChild"/>
-                        </dgm:if>
-                        <dgm:else name="Name137">
-                          <dgm:alg type="hierChild">
-                            <dgm:param type="linDir" val="fromR"/>
-                          </dgm:alg>
-                        </dgm:else>
-                      </dgm:choose>
-                    </dgm:if>
-                    <dgm:if name="Name138" func="var" arg="hierBranch" op="equ" val="init">
-                      <dgm:choose name="Name139">
-                        <dgm:if name="Name140" axis="des" func="maxDepth" op="lte" val="1">
-                          <dgm:alg type="hierChild">
-                            <dgm:param type="chAlign" val="l"/>
-                            <dgm:param type="linDir" val="fromT"/>
-                          </dgm:alg>
-                        </dgm:if>
-                        <dgm:else name="Name141">
-                          <dgm:alg type="hierChild"/>
-                        </dgm:else>
-                      </dgm:choose>
-                    </dgm:if>
-                    <dgm:else name="Name142"/>
-                  </dgm:choose>
-                  <dgm:shape xmlns:r="http://schemas.openxmlformats.org/officeDocument/2006/relationships" r:blip="">
-                    <dgm:adjLst/>
-                  </dgm:shape>
-                  <dgm:presOf/>
-                  <dgm:constrLst/>
-                  <dgm:ruleLst/>
-                  <dgm:forEach name="Name143" ref="rep2a"/>
-                </dgm:layoutNode>
-                <dgm:layoutNode name="hierChild7">
-                  <dgm:choose name="Name144">
-                    <dgm:if name="Name145" func="var" arg="dir" op="equ" val="norm">
-                      <dgm:alg type="hierChild">
-                        <dgm:param type="chAlign" val="l"/>
-                        <dgm:param type="linDir" val="fromL"/>
-                        <dgm:param type="secChAlign" val="t"/>
-                        <dgm:param type="secLinDir" val="fromT"/>
-                      </dgm:alg>
-                    </dgm:if>
-                    <dgm:else name="Name146">
-                      <dgm:alg type="hierChild">
-                        <dgm:param type="chAlign" val="l"/>
-                        <dgm:param type="linDir" val="fromR"/>
-                        <dgm:param type="secChAlign" val="t"/>
-                        <dgm:param type="secLinDir" val="fromT"/>
-                      </dgm:alg>
-                    </dgm:else>
-                  </dgm:choose>
-                  <dgm:shape xmlns:r="http://schemas.openxmlformats.org/officeDocument/2006/relationships" r:blip="">
-                    <dgm:adjLst/>
-                  </dgm:shape>
-                  <dgm:presOf/>
-                  <dgm:constrLst/>
-                  <dgm:ruleLst/>
-                  <dgm:forEach name="Name147" ref="rep2b"/>
-                </dgm:layoutNode>
-              </dgm:layoutNode>
-            </dgm:forEach>
-          </dgm:layoutNode>
-        </dgm:layoutNode>
-      </dgm:forEach>
+            </dgm:if>
+            <dgm:else name="Name7"/>
+          </dgm:choose>
+        </dgm:else>
+      </dgm:choose>
     </dgm:forEach>
   </dgm:layoutNode>
 </dgm:layoutDef>
@@ -47910,10 +47545,10 @@
       </p:sp>
       <p:graphicFrame>
         <p:nvGraphicFramePr>
-          <p:cNvPr id="4" name="Content Placeholder 3">
+          <p:cNvPr id="5" name="Content Placeholder 4">
             <a:extLst>
               <a:ext uri="{FF2B5EF4-FFF2-40B4-BE49-F238E27FC236}">
-                <a16:creationId xmlns:a16="http://schemas.microsoft.com/office/drawing/2014/main" id="{835207BF-F16F-4B26-9E05-A985B234A7FA}"/>
+                <a16:creationId xmlns:a16="http://schemas.microsoft.com/office/drawing/2014/main" id="{580C24E0-15D2-4E8F-B9E9-BB5B147F6D38}"/>
               </a:ext>
             </a:extLst>
           </p:cNvPr>
@@ -47924,14 +47559,14 @@
             <p:ph idx="1"/>
             <p:extLst>
               <p:ext uri="{D42A27DB-BD31-4B8C-83A1-F6EECF244321}">
-                <p14:modId xmlns:p14="http://schemas.microsoft.com/office/powerpoint/2010/main" val="2917291198"/>
+                <p14:modId xmlns:p14="http://schemas.microsoft.com/office/powerpoint/2010/main" val="1428603822"/>
               </p:ext>
             </p:extLst>
           </p:nvPr>
         </p:nvGraphicFramePr>
         <p:xfrm>
-          <a:off x="248462" y="345283"/>
-          <a:ext cx="10958606" cy="3881437"/>
+          <a:off x="354075" y="199497"/>
+          <a:ext cx="10581749" cy="4259148"/>
         </p:xfrm>
         <a:graphic>
           <a:graphicData uri="http://schemas.openxmlformats.org/drawingml/2006/diagram">

</xml_diff>